<commit_message>
add code review code
</commit_message>
<xml_diff>
--- a/codereview/tech-presentation-effective-codereview.pptx
+++ b/codereview/tech-presentation-effective-codereview.pptx
@@ -5,7 +5,7 @@
     <p:sldMasterId id="2147483648" r:id="rId1"/>
   </p:sldMasterIdLst>
   <p:notesMasterIdLst>
-    <p:notesMasterId r:id="rId25"/>
+    <p:notesMasterId r:id="rId27"/>
   </p:notesMasterIdLst>
   <p:sldIdLst>
     <p:sldId id="256" r:id="rId2"/>
@@ -20,17 +20,19 @@
     <p:sldId id="277" r:id="rId11"/>
     <p:sldId id="282" r:id="rId12"/>
     <p:sldId id="283" r:id="rId13"/>
-    <p:sldId id="275" r:id="rId14"/>
+    <p:sldId id="289" r:id="rId14"/>
     <p:sldId id="269" r:id="rId15"/>
-    <p:sldId id="270" r:id="rId16"/>
-    <p:sldId id="284" r:id="rId17"/>
-    <p:sldId id="285" r:id="rId18"/>
-    <p:sldId id="286" r:id="rId19"/>
-    <p:sldId id="287" r:id="rId20"/>
-    <p:sldId id="288" r:id="rId21"/>
-    <p:sldId id="271" r:id="rId22"/>
-    <p:sldId id="272" r:id="rId23"/>
-    <p:sldId id="267" r:id="rId24"/>
+    <p:sldId id="290" r:id="rId16"/>
+    <p:sldId id="270" r:id="rId17"/>
+    <p:sldId id="291" r:id="rId18"/>
+    <p:sldId id="284" r:id="rId19"/>
+    <p:sldId id="285" r:id="rId20"/>
+    <p:sldId id="286" r:id="rId21"/>
+    <p:sldId id="287" r:id="rId22"/>
+    <p:sldId id="288" r:id="rId23"/>
+    <p:sldId id="271" r:id="rId24"/>
+    <p:sldId id="272" r:id="rId25"/>
+    <p:sldId id="267" r:id="rId26"/>
   </p:sldIdLst>
   <p:sldSz cx="9144000" cy="6858000" type="screen4x3"/>
   <p:notesSz cx="6858000" cy="9144000"/>
@@ -230,7 +232,7 @@
           <a:p>
             <a:fld id="{436134EC-835B-48D8-BDB5-96D4A8A8ACE7}" type="datetimeFigureOut">
               <a:rPr lang="en-US" smtClean="0"/>
-              <a:t>3/13/2016</a:t>
+              <a:t>3/19/2016</a:t>
             </a:fld>
             <a:endParaRPr lang="en-US"/>
           </a:p>
@@ -980,7 +982,7 @@
           <a:p>
             <a:fld id="{216C5678-EE20-4FA5-88E2-6E0BD67A2E26}" type="datetime1">
               <a:rPr lang="en-US" smtClean="0"/>
-              <a:t>3/13/2016</a:t>
+              <a:t>3/19/2016</a:t>
             </a:fld>
             <a:endParaRPr lang="en-US" dirty="0"/>
           </a:p>
@@ -1150,7 +1152,7 @@
           <a:p>
             <a:fld id="{EA051B39-B140-43FE-96DB-472A2B59CE7C}" type="datetime1">
               <a:rPr lang="en-US" smtClean="0"/>
-              <a:t>3/13/2016</a:t>
+              <a:t>3/19/2016</a:t>
             </a:fld>
             <a:endParaRPr lang="en-US"/>
           </a:p>
@@ -1330,7 +1332,7 @@
           <a:p>
             <a:fld id="{DA600BB2-27C5-458B-ABCE-839C88CF47CE}" type="datetime1">
               <a:rPr lang="en-US" smtClean="0"/>
-              <a:t>3/13/2016</a:t>
+              <a:t>3/19/2016</a:t>
             </a:fld>
             <a:endParaRPr lang="en-US"/>
           </a:p>
@@ -1518,7 +1520,7 @@
           <a:p>
             <a:fld id="{B11D738E-8962-435F-8C43-147B8DD7E819}" type="datetime1">
               <a:rPr lang="en-US" smtClean="0"/>
-              <a:t>3/13/2016</a:t>
+              <a:t>3/19/2016</a:t>
             </a:fld>
             <a:endParaRPr lang="en-US"/>
           </a:p>
@@ -1785,7 +1787,7 @@
           <a:p>
             <a:fld id="{09CAEA93-55E7-4DA9-90C2-089A26EEFEC4}" type="datetime1">
               <a:rPr lang="en-US" smtClean="0"/>
-              <a:t>3/13/2016</a:t>
+              <a:t>3/19/2016</a:t>
             </a:fld>
             <a:endParaRPr lang="en-US"/>
           </a:p>
@@ -2138,7 +2140,7 @@
           <a:p>
             <a:fld id="{E34CF3C7-6809-4F39-BD67-A75817BDDE0A}" type="datetime1">
               <a:rPr lang="en-US" smtClean="0"/>
-              <a:t>3/13/2016</a:t>
+              <a:t>3/19/2016</a:t>
             </a:fld>
             <a:endParaRPr lang="en-US"/>
           </a:p>
@@ -2451,7 +2453,7 @@
           <a:p>
             <a:fld id="{F7EAEB24-CE78-465C-A726-91D0868FA48F}" type="datetime1">
               <a:rPr lang="en-US" smtClean="0"/>
-              <a:t>3/13/2016</a:t>
+              <a:t>3/19/2016</a:t>
             </a:fld>
             <a:endParaRPr lang="en-US"/>
           </a:p>
@@ -2683,7 +2685,7 @@
           <a:p>
             <a:fld id="{40BAADF0-1749-4E8B-9691-B44A5F8C0895}" type="datetime1">
               <a:rPr lang="en-US" smtClean="0"/>
-              <a:t>3/13/2016</a:t>
+              <a:t>3/19/2016</a:t>
             </a:fld>
             <a:endParaRPr lang="en-US"/>
           </a:p>
@@ -2778,7 +2780,7 @@
           <a:p>
             <a:fld id="{A8AF628A-A867-4937-BBE5-207DB6F9C51A}" type="datetime1">
               <a:rPr lang="en-US" smtClean="0"/>
-              <a:t>3/13/2016</a:t>
+              <a:t>3/19/2016</a:t>
             </a:fld>
             <a:endParaRPr lang="en-US"/>
           </a:p>
@@ -3071,7 +3073,7 @@
           <a:p>
             <a:fld id="{118BBB94-68E6-4675-A946-F1C5994EDBD7}" type="datetime1">
               <a:rPr lang="en-US" smtClean="0"/>
-              <a:t>3/13/2016</a:t>
+              <a:t>3/19/2016</a:t>
             </a:fld>
             <a:endParaRPr lang="en-US"/>
           </a:p>
@@ -3345,7 +3347,7 @@
           <a:p>
             <a:fld id="{DC3B8377-21E3-4835-B75D-4E2847E2750F}" type="datetime1">
               <a:rPr lang="en-US" smtClean="0"/>
-              <a:t>3/13/2016</a:t>
+              <a:t>3/19/2016</a:t>
             </a:fld>
             <a:endParaRPr lang="en-US"/>
           </a:p>
@@ -3560,7 +3562,7 @@
           <a:p>
             <a:fld id="{B0C4986D-6BE9-4264-908F-02DB36FD8D6C}" type="datetime1">
               <a:rPr lang="en-US" smtClean="0"/>
-              <a:t>3/13/2016</a:t>
+              <a:t>3/19/2016</a:t>
             </a:fld>
             <a:endParaRPr lang="en-US" dirty="0"/>
           </a:p>
@@ -4154,7 +4156,7 @@
           <a:p>
             <a:fld id="{216C5678-EE20-4FA5-88E2-6E0BD67A2E26}" type="datetime1">
               <a:rPr lang="en-US" smtClean="0"/>
-              <a:t>3/13/2016</a:t>
+              <a:t>3/19/2016</a:t>
             </a:fld>
             <a:endParaRPr lang="en-US" dirty="0"/>
           </a:p>
@@ -4321,7 +4323,7 @@
           <a:p>
             <a:fld id="{216C5678-EE20-4FA5-88E2-6E0BD67A2E26}" type="datetime1">
               <a:rPr lang="en-US" smtClean="0"/>
-              <a:t>3/13/2016</a:t>
+              <a:t>3/19/2016</a:t>
             </a:fld>
             <a:endParaRPr lang="en-US" dirty="0"/>
           </a:p>
@@ -4963,7 +4965,7 @@
           <a:p>
             <a:fld id="{216C5678-EE20-4FA5-88E2-6E0BD67A2E26}" type="datetime1">
               <a:rPr lang="en-US" smtClean="0"/>
-              <a:t>3/13/2016</a:t>
+              <a:t>3/19/2016</a:t>
             </a:fld>
             <a:endParaRPr lang="en-US" dirty="0"/>
           </a:p>
@@ -5611,7 +5613,7 @@
           <a:p>
             <a:fld id="{216C5678-EE20-4FA5-88E2-6E0BD67A2E26}" type="datetime1">
               <a:rPr lang="en-US" smtClean="0"/>
-              <a:t>3/13/2016</a:t>
+              <a:t>3/19/2016</a:t>
             </a:fld>
             <a:endParaRPr lang="en-US" dirty="0"/>
           </a:p>
@@ -6251,7 +6253,25 @@
             </a:pPr>
             <a:r>
               <a:rPr lang="en-US" sz="3200" dirty="0" smtClean="0"/>
-              <a:t>TODO</a:t>
+              <a:t>Use review as a “retaliation” or to “insult” other developers.</a:t>
+            </a:r>
+          </a:p>
+          <a:p>
+            <a:pPr marL="514350" indent="-514350" algn="l">
+              <a:buFont typeface="Arial" panose="020B0604020202020204" pitchFamily="34" charset="0"/>
+              <a:buChar char="•"/>
+            </a:pPr>
+            <a:r>
+              <a:rPr lang="en-US" sz="3200" dirty="0" smtClean="0"/>
+              <a:t>Use review “bug/defects</a:t>
+            </a:r>
+            <a:r>
+              <a:rPr lang="en-US" sz="3200" dirty="0"/>
+              <a:t>” report </a:t>
+            </a:r>
+            <a:r>
+              <a:rPr lang="en-US" sz="3200" dirty="0" smtClean="0"/>
+              <a:t>to gauge employees’ annual performance.</a:t>
             </a:r>
             <a:endParaRPr lang="en-US" sz="3200" dirty="0"/>
           </a:p>
@@ -6274,7 +6294,7 @@
           <a:p>
             <a:fld id="{216C5678-EE20-4FA5-88E2-6E0BD67A2E26}" type="datetime1">
               <a:rPr lang="en-US" smtClean="0"/>
-              <a:t>3/13/2016</a:t>
+              <a:t>3/19/2016</a:t>
             </a:fld>
             <a:endParaRPr lang="en-US" dirty="0"/>
           </a:p>
@@ -6330,7 +6350,7 @@
     </p:spTree>
     <p:extLst>
       <p:ext uri="{BB962C8B-B14F-4D97-AF65-F5344CB8AC3E}">
-        <p14:creationId xmlns:p14="http://schemas.microsoft.com/office/powerpoint/2010/main" val="3861664819"/>
+        <p14:creationId xmlns:p14="http://schemas.microsoft.com/office/powerpoint/2010/main" val="3315397029"/>
       </p:ext>
     </p:extLst>
   </p:cSld>
@@ -6403,7 +6423,7 @@
           <a:p>
             <a:fld id="{216C5678-EE20-4FA5-88E2-6E0BD67A2E26}" type="datetime1">
               <a:rPr lang="en-US" smtClean="0"/>
-              <a:t>3/13/2016</a:t>
+              <a:t>3/19/2016</a:t>
             </a:fld>
             <a:endParaRPr lang="en-US" dirty="0"/>
           </a:p>
@@ -6493,8 +6513,8 @@
               <a:buChar char="•"/>
             </a:pPr>
             <a:r>
-              <a:rPr lang="en-US" sz="2800" dirty="0" smtClean="0"/>
-              <a:t>DRY Principle</a:t>
+              <a:rPr lang="en-US" sz="2800" dirty="0"/>
+              <a:t>Consistency</a:t>
             </a:r>
           </a:p>
           <a:p>
@@ -6504,7 +6524,7 @@
             </a:pPr>
             <a:r>
               <a:rPr lang="en-US" sz="2800" dirty="0" smtClean="0"/>
-              <a:t>Testable</a:t>
+              <a:t>DRY Principle</a:t>
             </a:r>
           </a:p>
           <a:p>
@@ -6514,7 +6534,7 @@
             </a:pPr>
             <a:r>
               <a:rPr lang="en-US" sz="2800" dirty="0" smtClean="0"/>
-              <a:t>Consistency</a:t>
+              <a:t>Testable</a:t>
             </a:r>
           </a:p>
           <a:p>
@@ -6592,7 +6612,7 @@
         <p:spPr>
           <a:xfrm>
             <a:off x="685800" y="228600"/>
-            <a:ext cx="7772400" cy="685800"/>
+            <a:ext cx="9525000" cy="685800"/>
           </a:xfrm>
         </p:spPr>
         <p:txBody>
@@ -6602,15 +6622,7 @@
             <a:pPr algn="l"/>
             <a:r>
               <a:rPr lang="en-US" sz="4000" dirty="0" smtClean="0"/>
-              <a:t>Code Review Patterns (</a:t>
-            </a:r>
-            <a:r>
-              <a:rPr lang="en-US" sz="4000" dirty="0" err="1" smtClean="0"/>
-              <a:t>cont</a:t>
-            </a:r>
-            <a:r>
-              <a:rPr lang="en-US" sz="4000" dirty="0" smtClean="0"/>
-              <a:t>)</a:t>
+              <a:t>Code Review Patterns - Readability</a:t>
             </a:r>
             <a:endParaRPr lang="en-US" sz="4000" dirty="0"/>
           </a:p>
@@ -6633,7 +6645,7 @@
           <a:p>
             <a:fld id="{216C5678-EE20-4FA5-88E2-6E0BD67A2E26}" type="datetime1">
               <a:rPr lang="en-US" smtClean="0"/>
-              <a:t>3/13/2016</a:t>
+              <a:t>3/19/2016</a:t>
             </a:fld>
             <a:endParaRPr lang="en-US" dirty="0"/>
           </a:p>
@@ -6688,37 +6700,6 @@
       </p:sp>
       <p:sp>
         <p:nvSpPr>
-          <p:cNvPr id="8" name="Subtitle 2"/>
-          <p:cNvSpPr>
-            <a:spLocks noGrp="1"/>
-          </p:cNvSpPr>
-          <p:nvPr>
-            <p:ph type="subTitle" idx="1"/>
-          </p:nvPr>
-        </p:nvSpPr>
-        <p:spPr>
-          <a:xfrm>
-            <a:off x="228600" y="1066800"/>
-            <a:ext cx="7315200" cy="685800"/>
-          </a:xfrm>
-        </p:spPr>
-        <p:txBody>
-          <a:bodyPr>
-            <a:noAutofit/>
-          </a:bodyPr>
-          <a:lstStyle/>
-          <a:p>
-            <a:pPr algn="l"/>
-            <a:r>
-              <a:rPr lang="en-US" sz="3200" b="1" u="sng" dirty="0" smtClean="0"/>
-              <a:t>Readability</a:t>
-            </a:r>
-            <a:endParaRPr lang="en-US" sz="3200" b="1" u="sng" dirty="0"/>
-          </a:p>
-        </p:txBody>
-      </p:sp>
-      <p:sp>
-        <p:nvSpPr>
           <p:cNvPr id="9" name="Subtitle 6"/>
           <p:cNvSpPr txBox="1">
             <a:spLocks/>
@@ -6727,7 +6708,7 @@
         </p:nvSpPr>
         <p:spPr>
           <a:xfrm>
-            <a:off x="573183" y="1676400"/>
+            <a:off x="573183" y="990600"/>
             <a:ext cx="7854368" cy="4648200"/>
           </a:xfrm>
           <a:prstGeom prst="rect">
@@ -6900,7 +6881,7 @@
             </a:pPr>
             <a:r>
               <a:rPr lang="en-US" sz="2800" dirty="0" smtClean="0"/>
-              <a:t>Xx</a:t>
+              <a:t>Quite subjective.  </a:t>
             </a:r>
           </a:p>
           <a:p>
@@ -6910,7 +6891,47 @@
             </a:pPr>
             <a:r>
               <a:rPr lang="en-US" sz="2800" dirty="0" smtClean="0"/>
-              <a:t>Code Demo</a:t>
+              <a:t>Use style guide as a guideline.</a:t>
+            </a:r>
+          </a:p>
+          <a:p>
+            <a:pPr marL="342900" indent="-342900" algn="l">
+              <a:buFont typeface="Arial" panose="020B0604020202020204" pitchFamily="34" charset="0"/>
+              <a:buChar char="•"/>
+            </a:pPr>
+            <a:r>
+              <a:rPr lang="en-US" sz="2800" dirty="0" smtClean="0"/>
+              <a:t>Code should be </a:t>
+            </a:r>
+            <a:r>
+              <a:rPr lang="en-US" sz="2800" dirty="0" smtClean="0"/>
+              <a:t>readable &amp; understandable </a:t>
+            </a:r>
+            <a:r>
+              <a:rPr lang="en-US" sz="2800" dirty="0" smtClean="0"/>
+              <a:t>6 months or a year from now by different </a:t>
+            </a:r>
+            <a:r>
+              <a:rPr lang="en-US" sz="2800" dirty="0" smtClean="0"/>
+              <a:t>developers.</a:t>
+            </a:r>
+            <a:endParaRPr lang="en-US" sz="2800" dirty="0" smtClean="0"/>
+          </a:p>
+          <a:p>
+            <a:pPr marL="342900" indent="-342900" algn="l">
+              <a:buFont typeface="Arial" panose="020B0604020202020204" pitchFamily="34" charset="0"/>
+              <a:buChar char="•"/>
+            </a:pPr>
+            <a:endParaRPr lang="en-US" sz="2800" dirty="0" smtClean="0"/>
+          </a:p>
+          <a:p>
+            <a:pPr marL="342900" indent="-342900" algn="l">
+              <a:buFont typeface="Arial" panose="020B0604020202020204" pitchFamily="34" charset="0"/>
+              <a:buChar char="•"/>
+            </a:pPr>
+            <a:r>
+              <a:rPr lang="en-US" sz="2800" dirty="0" smtClean="0"/>
+              <a:t>Code Demo.</a:t>
             </a:r>
           </a:p>
         </p:txBody>
@@ -6918,7 +6939,7 @@
     </p:spTree>
     <p:extLst>
       <p:ext uri="{BB962C8B-B14F-4D97-AF65-F5344CB8AC3E}">
-        <p14:creationId xmlns:p14="http://schemas.microsoft.com/office/powerpoint/2010/main" val="398520826"/>
+        <p14:creationId xmlns:p14="http://schemas.microsoft.com/office/powerpoint/2010/main" val="2978454629"/>
       </p:ext>
     </p:extLst>
   </p:cSld>
@@ -6957,8 +6978,8 @@
         </p:nvSpPr>
         <p:spPr>
           <a:xfrm>
-            <a:off x="685800" y="228600"/>
-            <a:ext cx="7772400" cy="685800"/>
+            <a:off x="152400" y="838200"/>
+            <a:ext cx="9906000" cy="685800"/>
           </a:xfrm>
         </p:spPr>
         <p:txBody>
@@ -6967,8 +6988,19 @@
           <a:p>
             <a:pPr algn="l"/>
             <a:r>
+              <a:rPr lang="en-US" sz="4000" dirty="0"/>
+              <a:t>Code Review Patterns </a:t>
+            </a:r>
+            <a:r>
               <a:rPr lang="en-US" sz="4000" dirty="0" smtClean="0"/>
-              <a:t>Code Review Patterns (</a:t>
+              <a:t>– Readability </a:t>
+            </a:r>
+            <a:br>
+              <a:rPr lang="en-US" sz="4000" dirty="0" smtClean="0"/>
+            </a:br>
+            <a:r>
+              <a:rPr lang="en-US" sz="4000" dirty="0" smtClean="0"/>
+              <a:t>(</a:t>
             </a:r>
             <a:r>
               <a:rPr lang="en-US" sz="4000" dirty="0" err="1" smtClean="0"/>
@@ -6992,14 +7024,19 @@
             <p:ph type="dt" sz="half" idx="10"/>
           </p:nvPr>
         </p:nvSpPr>
-        <p:spPr/>
+        <p:spPr>
+          <a:xfrm>
+            <a:off x="6363347" y="7864475"/>
+            <a:ext cx="2085975" cy="365125"/>
+          </a:xfrm>
+        </p:spPr>
         <p:txBody>
           <a:bodyPr/>
           <a:lstStyle/>
           <a:p>
             <a:fld id="{216C5678-EE20-4FA5-88E2-6E0BD67A2E26}" type="datetime1">
               <a:rPr lang="en-US" smtClean="0"/>
-              <a:t>3/13/2016</a:t>
+              <a:t>3/19/2016</a:t>
             </a:fld>
             <a:endParaRPr lang="en-US" dirty="0"/>
           </a:p>
@@ -7015,7 +7052,12 @@
             <p:ph type="sldNum" sz="quarter" idx="11"/>
           </p:nvPr>
         </p:nvSpPr>
-        <p:spPr/>
+        <p:spPr>
+          <a:xfrm>
+            <a:off x="8543278" y="7864475"/>
+            <a:ext cx="561975" cy="365125"/>
+          </a:xfrm>
+        </p:spPr>
         <p:txBody>
           <a:bodyPr/>
           <a:lstStyle/>
@@ -7039,53 +7081,27 @@
             <p:ph type="ftr" sz="quarter" idx="12"/>
           </p:nvPr>
         </p:nvSpPr>
-        <p:spPr/>
-        <p:txBody>
-          <a:bodyPr/>
-          <a:lstStyle/>
-          <a:p>
-            <a:r>
-              <a:rPr lang="en-US" smtClean="0"/>
-              <a:t>Footer Text</a:t>
-            </a:r>
-            <a:endParaRPr lang="en-US" dirty="0"/>
-          </a:p>
-        </p:txBody>
-      </p:sp>
-      <p:sp>
-        <p:nvSpPr>
-          <p:cNvPr id="8" name="Subtitle 2"/>
-          <p:cNvSpPr>
-            <a:spLocks noGrp="1"/>
-          </p:cNvSpPr>
-          <p:nvPr>
-            <p:ph type="subTitle" idx="1"/>
-          </p:nvPr>
-        </p:nvSpPr>
         <p:spPr>
           <a:xfrm>
-            <a:off x="228600" y="1066800"/>
-            <a:ext cx="7315200" cy="685800"/>
+            <a:off x="659165" y="7864475"/>
+            <a:ext cx="2847975" cy="365125"/>
           </a:xfrm>
         </p:spPr>
         <p:txBody>
-          <a:bodyPr>
-            <a:noAutofit/>
-          </a:bodyPr>
-          <a:lstStyle/>
-          <a:p>
-            <a:pPr algn="l"/>
-            <a:r>
-              <a:rPr lang="en-US" sz="3200" b="1" u="sng" dirty="0" smtClean="0"/>
-              <a:t>DRY</a:t>
-            </a:r>
-            <a:endParaRPr lang="en-US" sz="3200" b="1" u="sng" dirty="0"/>
-          </a:p>
-        </p:txBody>
-      </p:sp>
-      <p:sp>
-        <p:nvSpPr>
-          <p:cNvPr id="7" name="Subtitle 6"/>
+          <a:bodyPr/>
+          <a:lstStyle/>
+          <a:p>
+            <a:r>
+              <a:rPr lang="en-US" smtClean="0"/>
+              <a:t>Footer Text</a:t>
+            </a:r>
+            <a:endParaRPr lang="en-US" dirty="0"/>
+          </a:p>
+        </p:txBody>
+      </p:sp>
+      <p:sp>
+        <p:nvSpPr>
+          <p:cNvPr id="9" name="Subtitle 6"/>
           <p:cNvSpPr txBox="1">
             <a:spLocks/>
           </p:cNvSpPr>
@@ -7093,8 +7109,8 @@
         </p:nvSpPr>
         <p:spPr>
           <a:xfrm>
-            <a:off x="573183" y="1676400"/>
-            <a:ext cx="7854368" cy="4648200"/>
+            <a:off x="304800" y="1708150"/>
+            <a:ext cx="7854368" cy="654050"/>
           </a:xfrm>
           <a:prstGeom prst="rect">
             <a:avLst/>
@@ -7260,13 +7276,198 @@
             </a:lvl9pPr>
           </a:lstStyle>
           <a:p>
+            <a:pPr algn="l"/>
+            <a:r>
+              <a:rPr lang="en-US" sz="2800" dirty="0" smtClean="0"/>
+              <a:t>What is wrong?</a:t>
+            </a:r>
+          </a:p>
+        </p:txBody>
+      </p:sp>
+      <p:sp>
+        <p:nvSpPr>
+          <p:cNvPr id="10" name="Subtitle 6"/>
+          <p:cNvSpPr txBox="1">
+            <a:spLocks/>
+          </p:cNvSpPr>
+          <p:nvPr/>
+        </p:nvSpPr>
+        <p:spPr>
+          <a:xfrm>
+            <a:off x="573183" y="2286000"/>
+            <a:ext cx="7854368" cy="2209800"/>
+          </a:xfrm>
+          <a:prstGeom prst="rect">
+            <a:avLst/>
+          </a:prstGeom>
+        </p:spPr>
+        <p:txBody>
+          <a:bodyPr vert="horz" lIns="91440" tIns="45720" rIns="91440" bIns="45720" rtlCol="0">
+            <a:normAutofit/>
+          </a:bodyPr>
+          <a:lstStyle>
+            <a:lvl1pPr marL="0" indent="0" algn="ctr" defTabSz="914400" rtl="0" eaLnBrk="1" latinLnBrk="0" hangingPunct="1">
+              <a:spcBef>
+                <a:spcPct val="20000"/>
+              </a:spcBef>
+              <a:buFont typeface="Arial" pitchFamily="34" charset="0"/>
+              <a:buNone/>
+              <a:defRPr sz="2400" kern="1200">
+                <a:solidFill>
+                  <a:schemeClr val="tx1">
+                    <a:tint val="75000"/>
+                  </a:schemeClr>
+                </a:solidFill>
+                <a:latin typeface="+mj-lt"/>
+                <a:ea typeface="+mn-ea"/>
+                <a:cs typeface="+mn-cs"/>
+              </a:defRPr>
+            </a:lvl1pPr>
+            <a:lvl2pPr marL="457200" indent="0" algn="ctr" defTabSz="914400" rtl="0" eaLnBrk="1" latinLnBrk="0" hangingPunct="1">
+              <a:spcBef>
+                <a:spcPct val="20000"/>
+              </a:spcBef>
+              <a:buFont typeface="Courier New" pitchFamily="49" charset="0"/>
+              <a:buNone/>
+              <a:defRPr sz="1600" kern="1200">
+                <a:solidFill>
+                  <a:schemeClr val="tx1">
+                    <a:tint val="75000"/>
+                  </a:schemeClr>
+                </a:solidFill>
+                <a:latin typeface="+mj-lt"/>
+                <a:ea typeface="+mn-ea"/>
+                <a:cs typeface="+mn-cs"/>
+              </a:defRPr>
+            </a:lvl2pPr>
+            <a:lvl3pPr marL="914400" indent="0" algn="ctr" defTabSz="914400" rtl="0" eaLnBrk="1" latinLnBrk="0" hangingPunct="1">
+              <a:spcBef>
+                <a:spcPct val="20000"/>
+              </a:spcBef>
+              <a:buFont typeface="Arial" pitchFamily="34" charset="0"/>
+              <a:buNone/>
+              <a:defRPr sz="1600" kern="1200">
+                <a:solidFill>
+                  <a:schemeClr val="tx1">
+                    <a:tint val="75000"/>
+                  </a:schemeClr>
+                </a:solidFill>
+                <a:latin typeface="+mj-lt"/>
+                <a:ea typeface="+mn-ea"/>
+                <a:cs typeface="+mn-cs"/>
+              </a:defRPr>
+            </a:lvl3pPr>
+            <a:lvl4pPr marL="1371600" indent="0" algn="ctr" defTabSz="914400" rtl="0" eaLnBrk="1" latinLnBrk="0" hangingPunct="1">
+              <a:spcBef>
+                <a:spcPct val="20000"/>
+              </a:spcBef>
+              <a:buFont typeface="Courier New" pitchFamily="49" charset="0"/>
+              <a:buNone/>
+              <a:defRPr sz="1600" kern="1200">
+                <a:solidFill>
+                  <a:schemeClr val="tx1">
+                    <a:tint val="75000"/>
+                  </a:schemeClr>
+                </a:solidFill>
+                <a:latin typeface="+mj-lt"/>
+                <a:ea typeface="+mn-ea"/>
+                <a:cs typeface="+mn-cs"/>
+              </a:defRPr>
+            </a:lvl4pPr>
+            <a:lvl5pPr marL="1828800" indent="0" algn="ctr" defTabSz="914400" rtl="0" eaLnBrk="1" latinLnBrk="0" hangingPunct="1">
+              <a:spcBef>
+                <a:spcPct val="20000"/>
+              </a:spcBef>
+              <a:buFont typeface="Arial" pitchFamily="34" charset="0"/>
+              <a:buNone/>
+              <a:defRPr sz="1600" kern="1200">
+                <a:solidFill>
+                  <a:schemeClr val="tx1">
+                    <a:tint val="75000"/>
+                  </a:schemeClr>
+                </a:solidFill>
+                <a:latin typeface="+mj-lt"/>
+                <a:ea typeface="+mn-ea"/>
+                <a:cs typeface="+mn-cs"/>
+              </a:defRPr>
+            </a:lvl5pPr>
+            <a:lvl6pPr marL="2286000" indent="0" algn="ctr" defTabSz="914400" rtl="0" eaLnBrk="1" latinLnBrk="0" hangingPunct="1">
+              <a:spcBef>
+                <a:spcPct val="20000"/>
+              </a:spcBef>
+              <a:buFont typeface="Courier New" pitchFamily="49" charset="0"/>
+              <a:buNone/>
+              <a:defRPr sz="1600" kern="1200">
+                <a:solidFill>
+                  <a:schemeClr val="tx1">
+                    <a:tint val="75000"/>
+                  </a:schemeClr>
+                </a:solidFill>
+                <a:latin typeface="+mj-lt"/>
+                <a:ea typeface="+mn-ea"/>
+                <a:cs typeface="+mn-cs"/>
+              </a:defRPr>
+            </a:lvl6pPr>
+            <a:lvl7pPr marL="2743200" indent="0" algn="ctr" defTabSz="914400" rtl="0" eaLnBrk="1" latinLnBrk="0" hangingPunct="1">
+              <a:spcBef>
+                <a:spcPct val="20000"/>
+              </a:spcBef>
+              <a:buFont typeface="Arial" pitchFamily="34" charset="0"/>
+              <a:buNone/>
+              <a:defRPr sz="1600" kern="1200">
+                <a:solidFill>
+                  <a:schemeClr val="tx1">
+                    <a:tint val="75000"/>
+                  </a:schemeClr>
+                </a:solidFill>
+                <a:latin typeface="+mj-lt"/>
+                <a:ea typeface="+mn-ea"/>
+                <a:cs typeface="+mn-cs"/>
+              </a:defRPr>
+            </a:lvl7pPr>
+            <a:lvl8pPr marL="3200400" indent="0" algn="ctr" defTabSz="914400" rtl="0" eaLnBrk="1" latinLnBrk="0" hangingPunct="1">
+              <a:spcBef>
+                <a:spcPct val="20000"/>
+              </a:spcBef>
+              <a:buFont typeface="Courier New" pitchFamily="49" charset="0"/>
+              <a:buNone/>
+              <a:defRPr sz="1600" kern="1200">
+                <a:solidFill>
+                  <a:schemeClr val="tx1">
+                    <a:tint val="75000"/>
+                  </a:schemeClr>
+                </a:solidFill>
+                <a:latin typeface="+mj-lt"/>
+                <a:ea typeface="+mn-ea"/>
+                <a:cs typeface="+mn-cs"/>
+              </a:defRPr>
+            </a:lvl8pPr>
+            <a:lvl9pPr marL="3657600" indent="0" algn="ctr" defTabSz="914400" rtl="0" eaLnBrk="1" latinLnBrk="0" hangingPunct="1">
+              <a:spcBef>
+                <a:spcPct val="20000"/>
+              </a:spcBef>
+              <a:buFont typeface="Arial" pitchFamily="34" charset="0"/>
+              <a:buNone/>
+              <a:defRPr sz="1600" kern="1200">
+                <a:solidFill>
+                  <a:schemeClr val="tx1">
+                    <a:tint val="75000"/>
+                  </a:schemeClr>
+                </a:solidFill>
+                <a:latin typeface="+mj-lt"/>
+                <a:ea typeface="+mn-ea"/>
+                <a:cs typeface="+mn-cs"/>
+              </a:defRPr>
+            </a:lvl9pPr>
+          </a:lstStyle>
+          <a:p>
             <a:pPr marL="342900" indent="-342900" algn="l">
               <a:buFont typeface="Arial" panose="020B0604020202020204" pitchFamily="34" charset="0"/>
               <a:buChar char="•"/>
             </a:pPr>
             <a:r>
-              <a:rPr lang="en-US" sz="2800" dirty="0" smtClean="0"/>
-              <a:t>Xx</a:t>
+              <a:rPr lang="en-US" dirty="0" smtClean="0"/>
+              <a:t>Not liberal use of whitespaces.</a:t>
             </a:r>
           </a:p>
           <a:p>
@@ -7275,8 +7476,229 @@
               <a:buChar char="•"/>
             </a:pPr>
             <a:r>
+              <a:rPr lang="en-US" dirty="0" smtClean="0"/>
+              <a:t>Poorly-worded variable names.</a:t>
+            </a:r>
+          </a:p>
+          <a:p>
+            <a:pPr marL="342900" indent="-342900" algn="l">
+              <a:buFont typeface="Arial" panose="020B0604020202020204" pitchFamily="34" charset="0"/>
+              <a:buChar char="•"/>
+            </a:pPr>
+            <a:r>
+              <a:rPr lang="en-US" dirty="0" smtClean="0"/>
+              <a:t>Lengthy line.</a:t>
+            </a:r>
+          </a:p>
+          <a:p>
+            <a:pPr marL="342900" indent="-342900" algn="l">
+              <a:buFont typeface="Arial" panose="020B0604020202020204" pitchFamily="34" charset="0"/>
+              <a:buChar char="•"/>
+            </a:pPr>
+            <a:r>
+              <a:rPr lang="en-US" dirty="0" smtClean="0"/>
+              <a:t>Mixture of </a:t>
+            </a:r>
+            <a:r>
+              <a:rPr lang="en-US" dirty="0" err="1" smtClean="0"/>
+              <a:t>underscore_casing</a:t>
+            </a:r>
+            <a:r>
+              <a:rPr lang="en-US" dirty="0" smtClean="0"/>
+              <a:t> and </a:t>
+            </a:r>
+            <a:r>
+              <a:rPr lang="en-US" dirty="0" err="1" smtClean="0"/>
+              <a:t>camelCase</a:t>
+            </a:r>
+            <a:r>
               <a:rPr lang="en-US" sz="2800" dirty="0" smtClean="0"/>
-              <a:t>Code Demo</a:t>
+              <a:t>.</a:t>
+            </a:r>
+          </a:p>
+        </p:txBody>
+      </p:sp>
+      <p:sp>
+        <p:nvSpPr>
+          <p:cNvPr id="11" name="Subtitle 6"/>
+          <p:cNvSpPr txBox="1">
+            <a:spLocks/>
+          </p:cNvSpPr>
+          <p:nvPr/>
+        </p:nvSpPr>
+        <p:spPr>
+          <a:xfrm>
+            <a:off x="349649" y="4603750"/>
+            <a:ext cx="7854368" cy="654050"/>
+          </a:xfrm>
+          <a:prstGeom prst="rect">
+            <a:avLst/>
+          </a:prstGeom>
+        </p:spPr>
+        <p:txBody>
+          <a:bodyPr vert="horz" lIns="91440" tIns="45720" rIns="91440" bIns="45720" rtlCol="0">
+            <a:normAutofit/>
+          </a:bodyPr>
+          <a:lstStyle>
+            <a:lvl1pPr marL="0" indent="0" algn="ctr" defTabSz="914400" rtl="0" eaLnBrk="1" latinLnBrk="0" hangingPunct="1">
+              <a:spcBef>
+                <a:spcPct val="20000"/>
+              </a:spcBef>
+              <a:buFont typeface="Arial" pitchFamily="34" charset="0"/>
+              <a:buNone/>
+              <a:defRPr sz="2400" kern="1200">
+                <a:solidFill>
+                  <a:schemeClr val="tx1">
+                    <a:tint val="75000"/>
+                  </a:schemeClr>
+                </a:solidFill>
+                <a:latin typeface="+mj-lt"/>
+                <a:ea typeface="+mn-ea"/>
+                <a:cs typeface="+mn-cs"/>
+              </a:defRPr>
+            </a:lvl1pPr>
+            <a:lvl2pPr marL="457200" indent="0" algn="ctr" defTabSz="914400" rtl="0" eaLnBrk="1" latinLnBrk="0" hangingPunct="1">
+              <a:spcBef>
+                <a:spcPct val="20000"/>
+              </a:spcBef>
+              <a:buFont typeface="Courier New" pitchFamily="49" charset="0"/>
+              <a:buNone/>
+              <a:defRPr sz="1600" kern="1200">
+                <a:solidFill>
+                  <a:schemeClr val="tx1">
+                    <a:tint val="75000"/>
+                  </a:schemeClr>
+                </a:solidFill>
+                <a:latin typeface="+mj-lt"/>
+                <a:ea typeface="+mn-ea"/>
+                <a:cs typeface="+mn-cs"/>
+              </a:defRPr>
+            </a:lvl2pPr>
+            <a:lvl3pPr marL="914400" indent="0" algn="ctr" defTabSz="914400" rtl="0" eaLnBrk="1" latinLnBrk="0" hangingPunct="1">
+              <a:spcBef>
+                <a:spcPct val="20000"/>
+              </a:spcBef>
+              <a:buFont typeface="Arial" pitchFamily="34" charset="0"/>
+              <a:buNone/>
+              <a:defRPr sz="1600" kern="1200">
+                <a:solidFill>
+                  <a:schemeClr val="tx1">
+                    <a:tint val="75000"/>
+                  </a:schemeClr>
+                </a:solidFill>
+                <a:latin typeface="+mj-lt"/>
+                <a:ea typeface="+mn-ea"/>
+                <a:cs typeface="+mn-cs"/>
+              </a:defRPr>
+            </a:lvl3pPr>
+            <a:lvl4pPr marL="1371600" indent="0" algn="ctr" defTabSz="914400" rtl="0" eaLnBrk="1" latinLnBrk="0" hangingPunct="1">
+              <a:spcBef>
+                <a:spcPct val="20000"/>
+              </a:spcBef>
+              <a:buFont typeface="Courier New" pitchFamily="49" charset="0"/>
+              <a:buNone/>
+              <a:defRPr sz="1600" kern="1200">
+                <a:solidFill>
+                  <a:schemeClr val="tx1">
+                    <a:tint val="75000"/>
+                  </a:schemeClr>
+                </a:solidFill>
+                <a:latin typeface="+mj-lt"/>
+                <a:ea typeface="+mn-ea"/>
+                <a:cs typeface="+mn-cs"/>
+              </a:defRPr>
+            </a:lvl4pPr>
+            <a:lvl5pPr marL="1828800" indent="0" algn="ctr" defTabSz="914400" rtl="0" eaLnBrk="1" latinLnBrk="0" hangingPunct="1">
+              <a:spcBef>
+                <a:spcPct val="20000"/>
+              </a:spcBef>
+              <a:buFont typeface="Arial" pitchFamily="34" charset="0"/>
+              <a:buNone/>
+              <a:defRPr sz="1600" kern="1200">
+                <a:solidFill>
+                  <a:schemeClr val="tx1">
+                    <a:tint val="75000"/>
+                  </a:schemeClr>
+                </a:solidFill>
+                <a:latin typeface="+mj-lt"/>
+                <a:ea typeface="+mn-ea"/>
+                <a:cs typeface="+mn-cs"/>
+              </a:defRPr>
+            </a:lvl5pPr>
+            <a:lvl6pPr marL="2286000" indent="0" algn="ctr" defTabSz="914400" rtl="0" eaLnBrk="1" latinLnBrk="0" hangingPunct="1">
+              <a:spcBef>
+                <a:spcPct val="20000"/>
+              </a:spcBef>
+              <a:buFont typeface="Courier New" pitchFamily="49" charset="0"/>
+              <a:buNone/>
+              <a:defRPr sz="1600" kern="1200">
+                <a:solidFill>
+                  <a:schemeClr val="tx1">
+                    <a:tint val="75000"/>
+                  </a:schemeClr>
+                </a:solidFill>
+                <a:latin typeface="+mj-lt"/>
+                <a:ea typeface="+mn-ea"/>
+                <a:cs typeface="+mn-cs"/>
+              </a:defRPr>
+            </a:lvl6pPr>
+            <a:lvl7pPr marL="2743200" indent="0" algn="ctr" defTabSz="914400" rtl="0" eaLnBrk="1" latinLnBrk="0" hangingPunct="1">
+              <a:spcBef>
+                <a:spcPct val="20000"/>
+              </a:spcBef>
+              <a:buFont typeface="Arial" pitchFamily="34" charset="0"/>
+              <a:buNone/>
+              <a:defRPr sz="1600" kern="1200">
+                <a:solidFill>
+                  <a:schemeClr val="tx1">
+                    <a:tint val="75000"/>
+                  </a:schemeClr>
+                </a:solidFill>
+                <a:latin typeface="+mj-lt"/>
+                <a:ea typeface="+mn-ea"/>
+                <a:cs typeface="+mn-cs"/>
+              </a:defRPr>
+            </a:lvl7pPr>
+            <a:lvl8pPr marL="3200400" indent="0" algn="ctr" defTabSz="914400" rtl="0" eaLnBrk="1" latinLnBrk="0" hangingPunct="1">
+              <a:spcBef>
+                <a:spcPct val="20000"/>
+              </a:spcBef>
+              <a:buFont typeface="Courier New" pitchFamily="49" charset="0"/>
+              <a:buNone/>
+              <a:defRPr sz="1600" kern="1200">
+                <a:solidFill>
+                  <a:schemeClr val="tx1">
+                    <a:tint val="75000"/>
+                  </a:schemeClr>
+                </a:solidFill>
+                <a:latin typeface="+mj-lt"/>
+                <a:ea typeface="+mn-ea"/>
+                <a:cs typeface="+mn-cs"/>
+              </a:defRPr>
+            </a:lvl8pPr>
+            <a:lvl9pPr marL="3657600" indent="0" algn="ctr" defTabSz="914400" rtl="0" eaLnBrk="1" latinLnBrk="0" hangingPunct="1">
+              <a:spcBef>
+                <a:spcPct val="20000"/>
+              </a:spcBef>
+              <a:buFont typeface="Arial" pitchFamily="34" charset="0"/>
+              <a:buNone/>
+              <a:defRPr sz="1600" kern="1200">
+                <a:solidFill>
+                  <a:schemeClr val="tx1">
+                    <a:tint val="75000"/>
+                  </a:schemeClr>
+                </a:solidFill>
+                <a:latin typeface="+mj-lt"/>
+                <a:ea typeface="+mn-ea"/>
+                <a:cs typeface="+mn-cs"/>
+              </a:defRPr>
+            </a:lvl9pPr>
+          </a:lstStyle>
+          <a:p>
+            <a:pPr algn="l"/>
+            <a:r>
+              <a:rPr lang="en-US" sz="2800" dirty="0" smtClean="0"/>
+              <a:t>How can we make it better?</a:t>
             </a:r>
           </a:p>
         </p:txBody>
@@ -7284,7 +7706,7 @@
     </p:spTree>
     <p:extLst>
       <p:ext uri="{BB962C8B-B14F-4D97-AF65-F5344CB8AC3E}">
-        <p14:creationId xmlns:p14="http://schemas.microsoft.com/office/powerpoint/2010/main" val="3369183476"/>
+        <p14:creationId xmlns:p14="http://schemas.microsoft.com/office/powerpoint/2010/main" val="398520826"/>
       </p:ext>
     </p:extLst>
   </p:cSld>
@@ -7323,8 +7745,8 @@
         </p:nvSpPr>
         <p:spPr>
           <a:xfrm>
-            <a:off x="685800" y="228600"/>
-            <a:ext cx="7772400" cy="685800"/>
+            <a:off x="152400" y="838200"/>
+            <a:ext cx="9906000" cy="685800"/>
           </a:xfrm>
         </p:spPr>
         <p:txBody>
@@ -7333,17 +7755,24 @@
           <a:p>
             <a:pPr algn="l"/>
             <a:r>
+              <a:rPr lang="en-US" sz="4000" dirty="0"/>
+              <a:t>Code Review Patterns </a:t>
+            </a:r>
+            <a:r>
               <a:rPr lang="en-US" sz="4000" dirty="0" smtClean="0"/>
-              <a:t>Code Review Patterns (</a:t>
-            </a:r>
-            <a:r>
-              <a:rPr lang="en-US" sz="4000" dirty="0" err="1" smtClean="0"/>
-              <a:t>cont</a:t>
+              <a:t>– </a:t>
             </a:r>
             <a:r>
               <a:rPr lang="en-US" sz="4000" dirty="0" smtClean="0"/>
-              <a:t>)</a:t>
-            </a:r>
+              <a:t>Consistency</a:t>
+            </a:r>
+            <a:r>
+              <a:rPr lang="en-US" sz="4000" dirty="0" smtClean="0"/>
+              <a:t/>
+            </a:r>
+            <a:br>
+              <a:rPr lang="en-US" sz="4000" dirty="0" smtClean="0"/>
+            </a:br>
             <a:endParaRPr lang="en-US" sz="4000" dirty="0"/>
           </a:p>
         </p:txBody>
@@ -7358,14 +7787,19 @@
             <p:ph type="dt" sz="half" idx="10"/>
           </p:nvPr>
         </p:nvSpPr>
-        <p:spPr/>
+        <p:spPr>
+          <a:xfrm>
+            <a:off x="6363347" y="7864475"/>
+            <a:ext cx="2085975" cy="365125"/>
+          </a:xfrm>
+        </p:spPr>
         <p:txBody>
           <a:bodyPr/>
           <a:lstStyle/>
           <a:p>
             <a:fld id="{216C5678-EE20-4FA5-88E2-6E0BD67A2E26}" type="datetime1">
               <a:rPr lang="en-US" smtClean="0"/>
-              <a:t>3/13/2016</a:t>
+              <a:t>3/19/2016</a:t>
             </a:fld>
             <a:endParaRPr lang="en-US" dirty="0"/>
           </a:p>
@@ -7381,7 +7815,12 @@
             <p:ph type="sldNum" sz="quarter" idx="11"/>
           </p:nvPr>
         </p:nvSpPr>
-        <p:spPr/>
+        <p:spPr>
+          <a:xfrm>
+            <a:off x="8543278" y="7864475"/>
+            <a:ext cx="561975" cy="365125"/>
+          </a:xfrm>
+        </p:spPr>
         <p:txBody>
           <a:bodyPr/>
           <a:lstStyle/>
@@ -7405,53 +7844,27 @@
             <p:ph type="ftr" sz="quarter" idx="12"/>
           </p:nvPr>
         </p:nvSpPr>
-        <p:spPr/>
-        <p:txBody>
-          <a:bodyPr/>
-          <a:lstStyle/>
-          <a:p>
-            <a:r>
-              <a:rPr lang="en-US" smtClean="0"/>
-              <a:t>Footer Text</a:t>
-            </a:r>
-            <a:endParaRPr lang="en-US" dirty="0"/>
-          </a:p>
-        </p:txBody>
-      </p:sp>
-      <p:sp>
-        <p:nvSpPr>
-          <p:cNvPr id="8" name="Subtitle 2"/>
-          <p:cNvSpPr>
-            <a:spLocks noGrp="1"/>
-          </p:cNvSpPr>
-          <p:nvPr>
-            <p:ph type="subTitle" idx="1"/>
-          </p:nvPr>
-        </p:nvSpPr>
         <p:spPr>
           <a:xfrm>
-            <a:off x="228600" y="1066800"/>
-            <a:ext cx="7315200" cy="685800"/>
+            <a:off x="659165" y="7864475"/>
+            <a:ext cx="2847975" cy="365125"/>
           </a:xfrm>
         </p:spPr>
         <p:txBody>
-          <a:bodyPr>
-            <a:noAutofit/>
-          </a:bodyPr>
-          <a:lstStyle/>
-          <a:p>
-            <a:pPr algn="l"/>
-            <a:r>
-              <a:rPr lang="en-US" sz="3200" b="1" u="sng" dirty="0" smtClean="0"/>
-              <a:t>Testable</a:t>
-            </a:r>
-            <a:endParaRPr lang="en-US" sz="3200" b="1" u="sng" dirty="0"/>
-          </a:p>
-        </p:txBody>
-      </p:sp>
-      <p:sp>
-        <p:nvSpPr>
-          <p:cNvPr id="7" name="Subtitle 6"/>
+          <a:bodyPr/>
+          <a:lstStyle/>
+          <a:p>
+            <a:r>
+              <a:rPr lang="en-US" smtClean="0"/>
+              <a:t>Footer Text</a:t>
+            </a:r>
+            <a:endParaRPr lang="en-US" dirty="0"/>
+          </a:p>
+        </p:txBody>
+      </p:sp>
+      <p:sp>
+        <p:nvSpPr>
+          <p:cNvPr id="12" name="Subtitle 6"/>
           <p:cNvSpPr txBox="1">
             <a:spLocks/>
           </p:cNvSpPr>
@@ -7459,7 +7872,7 @@
         </p:nvSpPr>
         <p:spPr>
           <a:xfrm>
-            <a:off x="573183" y="1676400"/>
+            <a:off x="573183" y="990600"/>
             <a:ext cx="7854368" cy="4648200"/>
           </a:xfrm>
           <a:prstGeom prst="rect">
@@ -7632,7 +8045,49 @@
             </a:pPr>
             <a:r>
               <a:rPr lang="en-US" sz="2800" dirty="0" smtClean="0"/>
-              <a:t>Xx</a:t>
+              <a:t>New code’s styles, error handing, patterns, </a:t>
+            </a:r>
+            <a:r>
+              <a:rPr lang="en-US" sz="2800" dirty="0" err="1" smtClean="0"/>
+              <a:t>etc</a:t>
+            </a:r>
+            <a:r>
+              <a:rPr lang="en-US" sz="2800" dirty="0" smtClean="0"/>
+              <a:t> should match those of existing </a:t>
+            </a:r>
+            <a:r>
+              <a:rPr lang="en-US" sz="2800" dirty="0" smtClean="0"/>
+              <a:t>code</a:t>
+            </a:r>
+            <a:r>
+              <a:rPr lang="en-US" sz="2800" dirty="0" smtClean="0"/>
+              <a:t>.</a:t>
+            </a:r>
+          </a:p>
+          <a:p>
+            <a:pPr algn="l"/>
+            <a:r>
+              <a:rPr lang="en-US" sz="2800" dirty="0" smtClean="0"/>
+              <a:t>     </a:t>
+            </a:r>
+            <a:r>
+              <a:rPr lang="en-US" sz="2000" i="1" dirty="0" smtClean="0"/>
+              <a:t>Exception: </a:t>
+            </a:r>
+            <a:r>
+              <a:rPr lang="en-US" sz="2000" i="1" dirty="0" smtClean="0"/>
+              <a:t>old, legacy code </a:t>
+            </a:r>
+            <a:r>
+              <a:rPr lang="en-US" sz="2000" i="1" dirty="0" smtClean="0"/>
+              <a:t>prior to code review process </a:t>
+            </a:r>
+          </a:p>
+          <a:p>
+            <a:pPr algn="l"/>
+            <a:r>
+              <a:rPr lang="en-US" sz="2000" i="1" dirty="0" smtClean="0"/>
+              <a:t>       is exempt.</a:t>
             </a:r>
           </a:p>
           <a:p>
@@ -7641,16 +8096,36 @@
               <a:buChar char="•"/>
             </a:pPr>
             <a:r>
+              <a:rPr lang="en-US" sz="2800" i="1" dirty="0" smtClean="0"/>
+              <a:t>Coding Style Guide should </a:t>
+            </a:r>
+            <a:r>
+              <a:rPr lang="en-US" sz="2800" i="1" smtClean="0"/>
+              <a:t>help.</a:t>
+            </a:r>
+            <a:endParaRPr lang="en-US" sz="2800" dirty="0" smtClean="0"/>
+          </a:p>
+          <a:p>
+            <a:pPr marL="342900" indent="-342900" algn="l">
+              <a:buFont typeface="Arial" panose="020B0604020202020204" pitchFamily="34" charset="0"/>
+              <a:buChar char="•"/>
+            </a:pPr>
+            <a:r>
               <a:rPr lang="en-US" sz="2800" dirty="0" smtClean="0"/>
-              <a:t>Code Demo</a:t>
-            </a:r>
+              <a:t>Code </a:t>
+            </a:r>
+            <a:r>
+              <a:rPr lang="en-US" sz="2800" dirty="0" smtClean="0"/>
+              <a:t>Demo.</a:t>
+            </a:r>
+            <a:endParaRPr lang="en-US" sz="2800" dirty="0" smtClean="0"/>
           </a:p>
         </p:txBody>
       </p:sp>
     </p:spTree>
     <p:extLst>
       <p:ext uri="{BB962C8B-B14F-4D97-AF65-F5344CB8AC3E}">
-        <p14:creationId xmlns:p14="http://schemas.microsoft.com/office/powerpoint/2010/main" val="536111359"/>
+        <p14:creationId xmlns:p14="http://schemas.microsoft.com/office/powerpoint/2010/main" val="2791645930"/>
       </p:ext>
     </p:extLst>
   </p:cSld>
@@ -7731,7 +8206,7 @@
           <a:p>
             <a:fld id="{216C5678-EE20-4FA5-88E2-6E0BD67A2E26}" type="datetime1">
               <a:rPr lang="en-US" smtClean="0"/>
-              <a:t>3/13/2016</a:t>
+              <a:t>3/19/2016</a:t>
             </a:fld>
             <a:endParaRPr lang="en-US" dirty="0"/>
           </a:p>
@@ -7809,7 +8284,7 @@
             <a:pPr algn="l"/>
             <a:r>
               <a:rPr lang="en-US" sz="3200" b="1" u="sng" dirty="0" smtClean="0"/>
-              <a:t>Consistency</a:t>
+              <a:t>DRY</a:t>
             </a:r>
             <a:endParaRPr lang="en-US" sz="3200" b="1" u="sng" dirty="0"/>
           </a:p>
@@ -8016,7 +8491,7 @@
     </p:spTree>
     <p:extLst>
       <p:ext uri="{BB962C8B-B14F-4D97-AF65-F5344CB8AC3E}">
-        <p14:creationId xmlns:p14="http://schemas.microsoft.com/office/powerpoint/2010/main" val="2904839594"/>
+        <p14:creationId xmlns:p14="http://schemas.microsoft.com/office/powerpoint/2010/main" val="3369183476"/>
       </p:ext>
     </p:extLst>
   </p:cSld>
@@ -8097,7 +8572,7 @@
           <a:p>
             <a:fld id="{216C5678-EE20-4FA5-88E2-6E0BD67A2E26}" type="datetime1">
               <a:rPr lang="en-US" smtClean="0"/>
-              <a:t>3/13/2016</a:t>
+              <a:t>3/19/2016</a:t>
             </a:fld>
             <a:endParaRPr lang="en-US" dirty="0"/>
           </a:p>
@@ -8175,7 +8650,7 @@
             <a:pPr algn="l"/>
             <a:r>
               <a:rPr lang="en-US" sz="3200" b="1" u="sng" dirty="0" smtClean="0"/>
-              <a:t>Readability</a:t>
+              <a:t>Testable</a:t>
             </a:r>
             <a:endParaRPr lang="en-US" sz="3200" b="1" u="sng" dirty="0"/>
           </a:p>
@@ -8382,7 +8857,7 @@
     </p:spTree>
     <p:extLst>
       <p:ext uri="{BB962C8B-B14F-4D97-AF65-F5344CB8AC3E}">
-        <p14:creationId xmlns:p14="http://schemas.microsoft.com/office/powerpoint/2010/main" val="1874786891"/>
+        <p14:creationId xmlns:p14="http://schemas.microsoft.com/office/powerpoint/2010/main" val="536111359"/>
       </p:ext>
     </p:extLst>
   </p:cSld>
@@ -8539,7 +9014,7 @@
           <a:p>
             <a:fld id="{216C5678-EE20-4FA5-88E2-6E0BD67A2E26}" type="datetime1">
               <a:rPr lang="en-US" smtClean="0"/>
-              <a:t>3/13/2016</a:t>
+              <a:t>3/19/2016</a:t>
             </a:fld>
             <a:endParaRPr lang="en-US" dirty="0"/>
           </a:p>
@@ -8676,7 +9151,7 @@
           <a:p>
             <a:fld id="{216C5678-EE20-4FA5-88E2-6E0BD67A2E26}" type="datetime1">
               <a:rPr lang="en-US" smtClean="0"/>
-              <a:t>3/13/2016</a:t>
+              <a:t>3/19/2016</a:t>
             </a:fld>
             <a:endParaRPr lang="en-US" dirty="0"/>
           </a:p>
@@ -8753,8 +9228,8 @@
           <a:p>
             <a:pPr algn="l"/>
             <a:r>
-              <a:rPr lang="en-US" sz="3200" b="1" u="sng" dirty="0" err="1" smtClean="0"/>
-              <a:t>Misc</a:t>
+              <a:rPr lang="en-US" sz="3200" b="1" u="sng" dirty="0" smtClean="0"/>
+              <a:t>Consistency</a:t>
             </a:r>
             <a:endParaRPr lang="en-US" sz="3200" b="1" u="sng" dirty="0"/>
           </a:p>
@@ -8961,7 +9436,7 @@
     </p:spTree>
     <p:extLst>
       <p:ext uri="{BB962C8B-B14F-4D97-AF65-F5344CB8AC3E}">
-        <p14:creationId xmlns:p14="http://schemas.microsoft.com/office/powerpoint/2010/main" val="3192479005"/>
+        <p14:creationId xmlns:p14="http://schemas.microsoft.com/office/powerpoint/2010/main" val="2904839594"/>
       </p:ext>
     </p:extLst>
   </p:cSld>
@@ -9011,7 +9486,15 @@
             <a:pPr algn="l"/>
             <a:r>
               <a:rPr lang="en-US" sz="4000" dirty="0" smtClean="0"/>
-              <a:t>Conclusion</a:t>
+              <a:t>Code Review Patterns (</a:t>
+            </a:r>
+            <a:r>
+              <a:rPr lang="en-US" sz="4000" dirty="0" err="1" smtClean="0"/>
+              <a:t>cont</a:t>
+            </a:r>
+            <a:r>
+              <a:rPr lang="en-US" sz="4000" dirty="0" smtClean="0"/>
+              <a:t>)</a:t>
             </a:r>
             <a:endParaRPr lang="en-US" sz="4000" dirty="0"/>
           </a:p>
@@ -9019,7 +9502,77 @@
       </p:sp>
       <p:sp>
         <p:nvSpPr>
-          <p:cNvPr id="3" name="Subtitle 2"/>
+          <p:cNvPr id="4" name="Date Placeholder 3"/>
+          <p:cNvSpPr>
+            <a:spLocks noGrp="1"/>
+          </p:cNvSpPr>
+          <p:nvPr>
+            <p:ph type="dt" sz="half" idx="10"/>
+          </p:nvPr>
+        </p:nvSpPr>
+        <p:spPr/>
+        <p:txBody>
+          <a:bodyPr/>
+          <a:lstStyle/>
+          <a:p>
+            <a:fld id="{216C5678-EE20-4FA5-88E2-6E0BD67A2E26}" type="datetime1">
+              <a:rPr lang="en-US" smtClean="0"/>
+              <a:t>3/19/2016</a:t>
+            </a:fld>
+            <a:endParaRPr lang="en-US" dirty="0"/>
+          </a:p>
+        </p:txBody>
+      </p:sp>
+      <p:sp>
+        <p:nvSpPr>
+          <p:cNvPr id="5" name="Slide Number Placeholder 4"/>
+          <p:cNvSpPr>
+            <a:spLocks noGrp="1"/>
+          </p:cNvSpPr>
+          <p:nvPr>
+            <p:ph type="sldNum" sz="quarter" idx="11"/>
+          </p:nvPr>
+        </p:nvSpPr>
+        <p:spPr/>
+        <p:txBody>
+          <a:bodyPr/>
+          <a:lstStyle/>
+          <a:p>
+            <a:fld id="{BA9B540C-44DA-4F69-89C9-7C84606640D3}" type="slidenum">
+              <a:rPr lang="en-US" smtClean="0"/>
+              <a:pPr/>
+              <a:t>21</a:t>
+            </a:fld>
+            <a:endParaRPr lang="en-US" dirty="0"/>
+          </a:p>
+        </p:txBody>
+      </p:sp>
+      <p:sp>
+        <p:nvSpPr>
+          <p:cNvPr id="6" name="Footer Placeholder 5"/>
+          <p:cNvSpPr>
+            <a:spLocks noGrp="1"/>
+          </p:cNvSpPr>
+          <p:nvPr>
+            <p:ph type="ftr" sz="quarter" idx="12"/>
+          </p:nvPr>
+        </p:nvSpPr>
+        <p:spPr/>
+        <p:txBody>
+          <a:bodyPr/>
+          <a:lstStyle/>
+          <a:p>
+            <a:r>
+              <a:rPr lang="en-US" smtClean="0"/>
+              <a:t>Footer Text</a:t>
+            </a:r>
+            <a:endParaRPr lang="en-US" dirty="0"/>
+          </a:p>
+        </p:txBody>
+      </p:sp>
+      <p:sp>
+        <p:nvSpPr>
+          <p:cNvPr id="8" name="Subtitle 2"/>
           <p:cNvSpPr>
             <a:spLocks noGrp="1"/>
           </p:cNvSpPr>
@@ -9029,8 +9582,8 @@
         </p:nvSpPr>
         <p:spPr>
           <a:xfrm>
-            <a:off x="762000" y="1219200"/>
-            <a:ext cx="7315200" cy="4343400"/>
+            <a:off x="228600" y="1066800"/>
+            <a:ext cx="7315200" cy="685800"/>
           </a:xfrm>
         </p:spPr>
         <p:txBody>
@@ -9038,22 +9591,200 @@
             <a:noAutofit/>
           </a:bodyPr>
           <a:lstStyle/>
+          <a:p>
+            <a:pPr algn="l"/>
+            <a:r>
+              <a:rPr lang="en-US" sz="3200" b="1" u="sng" dirty="0" smtClean="0"/>
+              <a:t>Readability</a:t>
+            </a:r>
+            <a:endParaRPr lang="en-US" sz="3200" b="1" u="sng" dirty="0"/>
+          </a:p>
+        </p:txBody>
+      </p:sp>
+      <p:sp>
+        <p:nvSpPr>
+          <p:cNvPr id="7" name="Subtitle 6"/>
+          <p:cNvSpPr txBox="1">
+            <a:spLocks/>
+          </p:cNvSpPr>
+          <p:nvPr/>
+        </p:nvSpPr>
+        <p:spPr>
+          <a:xfrm>
+            <a:off x="573183" y="1676400"/>
+            <a:ext cx="7854368" cy="4648200"/>
+          </a:xfrm>
+          <a:prstGeom prst="rect">
+            <a:avLst/>
+          </a:prstGeom>
+        </p:spPr>
+        <p:txBody>
+          <a:bodyPr vert="horz" lIns="91440" tIns="45720" rIns="91440" bIns="45720" rtlCol="0">
+            <a:normAutofit/>
+          </a:bodyPr>
+          <a:lstStyle>
+            <a:lvl1pPr marL="0" indent="0" algn="ctr" defTabSz="914400" rtl="0" eaLnBrk="1" latinLnBrk="0" hangingPunct="1">
+              <a:spcBef>
+                <a:spcPct val="20000"/>
+              </a:spcBef>
+              <a:buFont typeface="Arial" pitchFamily="34" charset="0"/>
+              <a:buNone/>
+              <a:defRPr sz="2400" kern="1200">
+                <a:solidFill>
+                  <a:schemeClr val="tx1">
+                    <a:tint val="75000"/>
+                  </a:schemeClr>
+                </a:solidFill>
+                <a:latin typeface="+mj-lt"/>
+                <a:ea typeface="+mn-ea"/>
+                <a:cs typeface="+mn-cs"/>
+              </a:defRPr>
+            </a:lvl1pPr>
+            <a:lvl2pPr marL="457200" indent="0" algn="ctr" defTabSz="914400" rtl="0" eaLnBrk="1" latinLnBrk="0" hangingPunct="1">
+              <a:spcBef>
+                <a:spcPct val="20000"/>
+              </a:spcBef>
+              <a:buFont typeface="Courier New" pitchFamily="49" charset="0"/>
+              <a:buNone/>
+              <a:defRPr sz="1600" kern="1200">
+                <a:solidFill>
+                  <a:schemeClr val="tx1">
+                    <a:tint val="75000"/>
+                  </a:schemeClr>
+                </a:solidFill>
+                <a:latin typeface="+mj-lt"/>
+                <a:ea typeface="+mn-ea"/>
+                <a:cs typeface="+mn-cs"/>
+              </a:defRPr>
+            </a:lvl2pPr>
+            <a:lvl3pPr marL="914400" indent="0" algn="ctr" defTabSz="914400" rtl="0" eaLnBrk="1" latinLnBrk="0" hangingPunct="1">
+              <a:spcBef>
+                <a:spcPct val="20000"/>
+              </a:spcBef>
+              <a:buFont typeface="Arial" pitchFamily="34" charset="0"/>
+              <a:buNone/>
+              <a:defRPr sz="1600" kern="1200">
+                <a:solidFill>
+                  <a:schemeClr val="tx1">
+                    <a:tint val="75000"/>
+                  </a:schemeClr>
+                </a:solidFill>
+                <a:latin typeface="+mj-lt"/>
+                <a:ea typeface="+mn-ea"/>
+                <a:cs typeface="+mn-cs"/>
+              </a:defRPr>
+            </a:lvl3pPr>
+            <a:lvl4pPr marL="1371600" indent="0" algn="ctr" defTabSz="914400" rtl="0" eaLnBrk="1" latinLnBrk="0" hangingPunct="1">
+              <a:spcBef>
+                <a:spcPct val="20000"/>
+              </a:spcBef>
+              <a:buFont typeface="Courier New" pitchFamily="49" charset="0"/>
+              <a:buNone/>
+              <a:defRPr sz="1600" kern="1200">
+                <a:solidFill>
+                  <a:schemeClr val="tx1">
+                    <a:tint val="75000"/>
+                  </a:schemeClr>
+                </a:solidFill>
+                <a:latin typeface="+mj-lt"/>
+                <a:ea typeface="+mn-ea"/>
+                <a:cs typeface="+mn-cs"/>
+              </a:defRPr>
+            </a:lvl4pPr>
+            <a:lvl5pPr marL="1828800" indent="0" algn="ctr" defTabSz="914400" rtl="0" eaLnBrk="1" latinLnBrk="0" hangingPunct="1">
+              <a:spcBef>
+                <a:spcPct val="20000"/>
+              </a:spcBef>
+              <a:buFont typeface="Arial" pitchFamily="34" charset="0"/>
+              <a:buNone/>
+              <a:defRPr sz="1600" kern="1200">
+                <a:solidFill>
+                  <a:schemeClr val="tx1">
+                    <a:tint val="75000"/>
+                  </a:schemeClr>
+                </a:solidFill>
+                <a:latin typeface="+mj-lt"/>
+                <a:ea typeface="+mn-ea"/>
+                <a:cs typeface="+mn-cs"/>
+              </a:defRPr>
+            </a:lvl5pPr>
+            <a:lvl6pPr marL="2286000" indent="0" algn="ctr" defTabSz="914400" rtl="0" eaLnBrk="1" latinLnBrk="0" hangingPunct="1">
+              <a:spcBef>
+                <a:spcPct val="20000"/>
+              </a:spcBef>
+              <a:buFont typeface="Courier New" pitchFamily="49" charset="0"/>
+              <a:buNone/>
+              <a:defRPr sz="1600" kern="1200">
+                <a:solidFill>
+                  <a:schemeClr val="tx1">
+                    <a:tint val="75000"/>
+                  </a:schemeClr>
+                </a:solidFill>
+                <a:latin typeface="+mj-lt"/>
+                <a:ea typeface="+mn-ea"/>
+                <a:cs typeface="+mn-cs"/>
+              </a:defRPr>
+            </a:lvl6pPr>
+            <a:lvl7pPr marL="2743200" indent="0" algn="ctr" defTabSz="914400" rtl="0" eaLnBrk="1" latinLnBrk="0" hangingPunct="1">
+              <a:spcBef>
+                <a:spcPct val="20000"/>
+              </a:spcBef>
+              <a:buFont typeface="Arial" pitchFamily="34" charset="0"/>
+              <a:buNone/>
+              <a:defRPr sz="1600" kern="1200">
+                <a:solidFill>
+                  <a:schemeClr val="tx1">
+                    <a:tint val="75000"/>
+                  </a:schemeClr>
+                </a:solidFill>
+                <a:latin typeface="+mj-lt"/>
+                <a:ea typeface="+mn-ea"/>
+                <a:cs typeface="+mn-cs"/>
+              </a:defRPr>
+            </a:lvl7pPr>
+            <a:lvl8pPr marL="3200400" indent="0" algn="ctr" defTabSz="914400" rtl="0" eaLnBrk="1" latinLnBrk="0" hangingPunct="1">
+              <a:spcBef>
+                <a:spcPct val="20000"/>
+              </a:spcBef>
+              <a:buFont typeface="Courier New" pitchFamily="49" charset="0"/>
+              <a:buNone/>
+              <a:defRPr sz="1600" kern="1200">
+                <a:solidFill>
+                  <a:schemeClr val="tx1">
+                    <a:tint val="75000"/>
+                  </a:schemeClr>
+                </a:solidFill>
+                <a:latin typeface="+mj-lt"/>
+                <a:ea typeface="+mn-ea"/>
+                <a:cs typeface="+mn-cs"/>
+              </a:defRPr>
+            </a:lvl8pPr>
+            <a:lvl9pPr marL="3657600" indent="0" algn="ctr" defTabSz="914400" rtl="0" eaLnBrk="1" latinLnBrk="0" hangingPunct="1">
+              <a:spcBef>
+                <a:spcPct val="20000"/>
+              </a:spcBef>
+              <a:buFont typeface="Arial" pitchFamily="34" charset="0"/>
+              <a:buNone/>
+              <a:defRPr sz="1600" kern="1200">
+                <a:solidFill>
+                  <a:schemeClr val="tx1">
+                    <a:tint val="75000"/>
+                  </a:schemeClr>
+                </a:solidFill>
+                <a:latin typeface="+mj-lt"/>
+                <a:ea typeface="+mn-ea"/>
+                <a:cs typeface="+mn-cs"/>
+              </a:defRPr>
+            </a:lvl9pPr>
+          </a:lstStyle>
           <a:p>
             <a:pPr marL="342900" indent="-342900" algn="l">
               <a:buFont typeface="Arial" panose="020B0604020202020204" pitchFamily="34" charset="0"/>
               <a:buChar char="•"/>
             </a:pPr>
             <a:r>
-              <a:rPr lang="en-US" sz="3200" dirty="0" smtClean="0"/>
-              <a:t>Discussed the 3 </a:t>
-            </a:r>
-            <a:r>
-              <a:rPr lang="en-US" sz="3200" dirty="0" err="1" smtClean="0"/>
-              <a:t>Ws</a:t>
-            </a:r>
-            <a:r>
-              <a:rPr lang="en-US" sz="3200" dirty="0" smtClean="0"/>
-              <a:t> and How.</a:t>
+              <a:rPr lang="en-US" sz="2800" dirty="0" smtClean="0"/>
+              <a:t>Xx</a:t>
             </a:r>
           </a:p>
           <a:p>
@@ -9062,105 +9793,16 @@
               <a:buChar char="•"/>
             </a:pPr>
             <a:r>
-              <a:rPr lang="en-US" sz="3200" dirty="0" smtClean="0"/>
-              <a:t>Discussed the pros and cons of three review approaches.</a:t>
-            </a:r>
-          </a:p>
-          <a:p>
-            <a:pPr marL="342900" indent="-342900" algn="l">
-              <a:buFont typeface="Arial" panose="020B0604020202020204" pitchFamily="34" charset="0"/>
-              <a:buChar char="•"/>
-            </a:pPr>
-            <a:r>
-              <a:rPr lang="en-US" sz="3200" dirty="0" smtClean="0"/>
-              <a:t>Discussed various code review patterns and </a:t>
-            </a:r>
-            <a:r>
-              <a:rPr lang="en-US" sz="3200" dirty="0" err="1" smtClean="0"/>
-              <a:t>gotchas</a:t>
-            </a:r>
-            <a:r>
-              <a:rPr lang="en-US" sz="3200" smtClean="0"/>
-              <a:t>.</a:t>
-            </a:r>
-            <a:endParaRPr lang="en-US" sz="3200" dirty="0"/>
-          </a:p>
-        </p:txBody>
-      </p:sp>
-      <p:sp>
-        <p:nvSpPr>
-          <p:cNvPr id="4" name="Date Placeholder 3"/>
-          <p:cNvSpPr>
-            <a:spLocks noGrp="1"/>
-          </p:cNvSpPr>
-          <p:nvPr>
-            <p:ph type="dt" sz="half" idx="10"/>
-          </p:nvPr>
-        </p:nvSpPr>
-        <p:spPr/>
-        <p:txBody>
-          <a:bodyPr/>
-          <a:lstStyle/>
-          <a:p>
-            <a:fld id="{216C5678-EE20-4FA5-88E2-6E0BD67A2E26}" type="datetime1">
-              <a:rPr lang="en-US" smtClean="0"/>
-              <a:t>3/13/2016</a:t>
-            </a:fld>
-            <a:endParaRPr lang="en-US" dirty="0"/>
-          </a:p>
-        </p:txBody>
-      </p:sp>
-      <p:sp>
-        <p:nvSpPr>
-          <p:cNvPr id="5" name="Slide Number Placeholder 4"/>
-          <p:cNvSpPr>
-            <a:spLocks noGrp="1"/>
-          </p:cNvSpPr>
-          <p:nvPr>
-            <p:ph type="sldNum" sz="quarter" idx="11"/>
-          </p:nvPr>
-        </p:nvSpPr>
-        <p:spPr/>
-        <p:txBody>
-          <a:bodyPr/>
-          <a:lstStyle/>
-          <a:p>
-            <a:fld id="{BA9B540C-44DA-4F69-89C9-7C84606640D3}" type="slidenum">
-              <a:rPr lang="en-US" smtClean="0"/>
-              <a:pPr/>
-              <a:t>21</a:t>
-            </a:fld>
-            <a:endParaRPr lang="en-US" dirty="0"/>
-          </a:p>
-        </p:txBody>
-      </p:sp>
-      <p:sp>
-        <p:nvSpPr>
-          <p:cNvPr id="6" name="Footer Placeholder 5"/>
-          <p:cNvSpPr>
-            <a:spLocks noGrp="1"/>
-          </p:cNvSpPr>
-          <p:nvPr>
-            <p:ph type="ftr" sz="quarter" idx="12"/>
-          </p:nvPr>
-        </p:nvSpPr>
-        <p:spPr/>
-        <p:txBody>
-          <a:bodyPr/>
-          <a:lstStyle/>
-          <a:p>
-            <a:r>
-              <a:rPr lang="en-US" smtClean="0"/>
-              <a:t>Footer Text</a:t>
-            </a:r>
-            <a:endParaRPr lang="en-US" dirty="0"/>
+              <a:rPr lang="en-US" sz="2800" dirty="0" smtClean="0"/>
+              <a:t>Code Demo</a:t>
+            </a:r>
           </a:p>
         </p:txBody>
       </p:sp>
     </p:spTree>
     <p:extLst>
       <p:ext uri="{BB962C8B-B14F-4D97-AF65-F5344CB8AC3E}">
-        <p14:creationId xmlns:p14="http://schemas.microsoft.com/office/powerpoint/2010/main" val="2740892730"/>
+        <p14:creationId xmlns:p14="http://schemas.microsoft.com/office/powerpoint/2010/main" val="1874786891"/>
       </p:ext>
     </p:extLst>
   </p:cSld>
@@ -9210,7 +9852,15 @@
             <a:pPr algn="l"/>
             <a:r>
               <a:rPr lang="en-US" sz="4000" dirty="0" smtClean="0"/>
-              <a:t>xx</a:t>
+              <a:t>Code Review Patterns (</a:t>
+            </a:r>
+            <a:r>
+              <a:rPr lang="en-US" sz="4000" dirty="0" err="1" smtClean="0"/>
+              <a:t>cont</a:t>
+            </a:r>
+            <a:r>
+              <a:rPr lang="en-US" sz="4000" dirty="0" smtClean="0"/>
+              <a:t>)</a:t>
             </a:r>
             <a:endParaRPr lang="en-US" sz="4000" dirty="0"/>
           </a:p>
@@ -9218,7 +9868,77 @@
       </p:sp>
       <p:sp>
         <p:nvSpPr>
-          <p:cNvPr id="3" name="Subtitle 2"/>
+          <p:cNvPr id="4" name="Date Placeholder 3"/>
+          <p:cNvSpPr>
+            <a:spLocks noGrp="1"/>
+          </p:cNvSpPr>
+          <p:nvPr>
+            <p:ph type="dt" sz="half" idx="10"/>
+          </p:nvPr>
+        </p:nvSpPr>
+        <p:spPr/>
+        <p:txBody>
+          <a:bodyPr/>
+          <a:lstStyle/>
+          <a:p>
+            <a:fld id="{216C5678-EE20-4FA5-88E2-6E0BD67A2E26}" type="datetime1">
+              <a:rPr lang="en-US" smtClean="0"/>
+              <a:t>3/19/2016</a:t>
+            </a:fld>
+            <a:endParaRPr lang="en-US" dirty="0"/>
+          </a:p>
+        </p:txBody>
+      </p:sp>
+      <p:sp>
+        <p:nvSpPr>
+          <p:cNvPr id="5" name="Slide Number Placeholder 4"/>
+          <p:cNvSpPr>
+            <a:spLocks noGrp="1"/>
+          </p:cNvSpPr>
+          <p:nvPr>
+            <p:ph type="sldNum" sz="quarter" idx="11"/>
+          </p:nvPr>
+        </p:nvSpPr>
+        <p:spPr/>
+        <p:txBody>
+          <a:bodyPr/>
+          <a:lstStyle/>
+          <a:p>
+            <a:fld id="{BA9B540C-44DA-4F69-89C9-7C84606640D3}" type="slidenum">
+              <a:rPr lang="en-US" smtClean="0"/>
+              <a:pPr/>
+              <a:t>22</a:t>
+            </a:fld>
+            <a:endParaRPr lang="en-US" dirty="0"/>
+          </a:p>
+        </p:txBody>
+      </p:sp>
+      <p:sp>
+        <p:nvSpPr>
+          <p:cNvPr id="6" name="Footer Placeholder 5"/>
+          <p:cNvSpPr>
+            <a:spLocks noGrp="1"/>
+          </p:cNvSpPr>
+          <p:nvPr>
+            <p:ph type="ftr" sz="quarter" idx="12"/>
+          </p:nvPr>
+        </p:nvSpPr>
+        <p:spPr/>
+        <p:txBody>
+          <a:bodyPr/>
+          <a:lstStyle/>
+          <a:p>
+            <a:r>
+              <a:rPr lang="en-US" smtClean="0"/>
+              <a:t>Footer Text</a:t>
+            </a:r>
+            <a:endParaRPr lang="en-US" dirty="0"/>
+          </a:p>
+        </p:txBody>
+      </p:sp>
+      <p:sp>
+        <p:nvSpPr>
+          <p:cNvPr id="8" name="Subtitle 2"/>
           <p:cNvSpPr>
             <a:spLocks noGrp="1"/>
           </p:cNvSpPr>
@@ -9228,8 +9948,8 @@
         </p:nvSpPr>
         <p:spPr>
           <a:xfrm>
-            <a:off x="762000" y="1219200"/>
-            <a:ext cx="7315200" cy="4343400"/>
+            <a:off x="228600" y="1066800"/>
+            <a:ext cx="7315200" cy="685800"/>
           </a:xfrm>
         </p:spPr>
         <p:txBody>
@@ -9237,89 +9957,218 @@
             <a:noAutofit/>
           </a:bodyPr>
           <a:lstStyle/>
+          <a:p>
+            <a:pPr algn="l"/>
+            <a:r>
+              <a:rPr lang="en-US" sz="3200" b="1" u="sng" dirty="0" err="1" smtClean="0"/>
+              <a:t>Misc</a:t>
+            </a:r>
+            <a:endParaRPr lang="en-US" sz="3200" b="1" u="sng" dirty="0"/>
+          </a:p>
+        </p:txBody>
+      </p:sp>
+      <p:sp>
+        <p:nvSpPr>
+          <p:cNvPr id="7" name="Subtitle 6"/>
+          <p:cNvSpPr txBox="1">
+            <a:spLocks/>
+          </p:cNvSpPr>
+          <p:nvPr/>
+        </p:nvSpPr>
+        <p:spPr>
+          <a:xfrm>
+            <a:off x="573183" y="1676400"/>
+            <a:ext cx="7854368" cy="4648200"/>
+          </a:xfrm>
+          <a:prstGeom prst="rect">
+            <a:avLst/>
+          </a:prstGeom>
+        </p:spPr>
+        <p:txBody>
+          <a:bodyPr vert="horz" lIns="91440" tIns="45720" rIns="91440" bIns="45720" rtlCol="0">
+            <a:normAutofit/>
+          </a:bodyPr>
+          <a:lstStyle>
+            <a:lvl1pPr marL="0" indent="0" algn="ctr" defTabSz="914400" rtl="0" eaLnBrk="1" latinLnBrk="0" hangingPunct="1">
+              <a:spcBef>
+                <a:spcPct val="20000"/>
+              </a:spcBef>
+              <a:buFont typeface="Arial" pitchFamily="34" charset="0"/>
+              <a:buNone/>
+              <a:defRPr sz="2400" kern="1200">
+                <a:solidFill>
+                  <a:schemeClr val="tx1">
+                    <a:tint val="75000"/>
+                  </a:schemeClr>
+                </a:solidFill>
+                <a:latin typeface="+mj-lt"/>
+                <a:ea typeface="+mn-ea"/>
+                <a:cs typeface="+mn-cs"/>
+              </a:defRPr>
+            </a:lvl1pPr>
+            <a:lvl2pPr marL="457200" indent="0" algn="ctr" defTabSz="914400" rtl="0" eaLnBrk="1" latinLnBrk="0" hangingPunct="1">
+              <a:spcBef>
+                <a:spcPct val="20000"/>
+              </a:spcBef>
+              <a:buFont typeface="Courier New" pitchFamily="49" charset="0"/>
+              <a:buNone/>
+              <a:defRPr sz="1600" kern="1200">
+                <a:solidFill>
+                  <a:schemeClr val="tx1">
+                    <a:tint val="75000"/>
+                  </a:schemeClr>
+                </a:solidFill>
+                <a:latin typeface="+mj-lt"/>
+                <a:ea typeface="+mn-ea"/>
+                <a:cs typeface="+mn-cs"/>
+              </a:defRPr>
+            </a:lvl2pPr>
+            <a:lvl3pPr marL="914400" indent="0" algn="ctr" defTabSz="914400" rtl="0" eaLnBrk="1" latinLnBrk="0" hangingPunct="1">
+              <a:spcBef>
+                <a:spcPct val="20000"/>
+              </a:spcBef>
+              <a:buFont typeface="Arial" pitchFamily="34" charset="0"/>
+              <a:buNone/>
+              <a:defRPr sz="1600" kern="1200">
+                <a:solidFill>
+                  <a:schemeClr val="tx1">
+                    <a:tint val="75000"/>
+                  </a:schemeClr>
+                </a:solidFill>
+                <a:latin typeface="+mj-lt"/>
+                <a:ea typeface="+mn-ea"/>
+                <a:cs typeface="+mn-cs"/>
+              </a:defRPr>
+            </a:lvl3pPr>
+            <a:lvl4pPr marL="1371600" indent="0" algn="ctr" defTabSz="914400" rtl="0" eaLnBrk="1" latinLnBrk="0" hangingPunct="1">
+              <a:spcBef>
+                <a:spcPct val="20000"/>
+              </a:spcBef>
+              <a:buFont typeface="Courier New" pitchFamily="49" charset="0"/>
+              <a:buNone/>
+              <a:defRPr sz="1600" kern="1200">
+                <a:solidFill>
+                  <a:schemeClr val="tx1">
+                    <a:tint val="75000"/>
+                  </a:schemeClr>
+                </a:solidFill>
+                <a:latin typeface="+mj-lt"/>
+                <a:ea typeface="+mn-ea"/>
+                <a:cs typeface="+mn-cs"/>
+              </a:defRPr>
+            </a:lvl4pPr>
+            <a:lvl5pPr marL="1828800" indent="0" algn="ctr" defTabSz="914400" rtl="0" eaLnBrk="1" latinLnBrk="0" hangingPunct="1">
+              <a:spcBef>
+                <a:spcPct val="20000"/>
+              </a:spcBef>
+              <a:buFont typeface="Arial" pitchFamily="34" charset="0"/>
+              <a:buNone/>
+              <a:defRPr sz="1600" kern="1200">
+                <a:solidFill>
+                  <a:schemeClr val="tx1">
+                    <a:tint val="75000"/>
+                  </a:schemeClr>
+                </a:solidFill>
+                <a:latin typeface="+mj-lt"/>
+                <a:ea typeface="+mn-ea"/>
+                <a:cs typeface="+mn-cs"/>
+              </a:defRPr>
+            </a:lvl5pPr>
+            <a:lvl6pPr marL="2286000" indent="0" algn="ctr" defTabSz="914400" rtl="0" eaLnBrk="1" latinLnBrk="0" hangingPunct="1">
+              <a:spcBef>
+                <a:spcPct val="20000"/>
+              </a:spcBef>
+              <a:buFont typeface="Courier New" pitchFamily="49" charset="0"/>
+              <a:buNone/>
+              <a:defRPr sz="1600" kern="1200">
+                <a:solidFill>
+                  <a:schemeClr val="tx1">
+                    <a:tint val="75000"/>
+                  </a:schemeClr>
+                </a:solidFill>
+                <a:latin typeface="+mj-lt"/>
+                <a:ea typeface="+mn-ea"/>
+                <a:cs typeface="+mn-cs"/>
+              </a:defRPr>
+            </a:lvl6pPr>
+            <a:lvl7pPr marL="2743200" indent="0" algn="ctr" defTabSz="914400" rtl="0" eaLnBrk="1" latinLnBrk="0" hangingPunct="1">
+              <a:spcBef>
+                <a:spcPct val="20000"/>
+              </a:spcBef>
+              <a:buFont typeface="Arial" pitchFamily="34" charset="0"/>
+              <a:buNone/>
+              <a:defRPr sz="1600" kern="1200">
+                <a:solidFill>
+                  <a:schemeClr val="tx1">
+                    <a:tint val="75000"/>
+                  </a:schemeClr>
+                </a:solidFill>
+                <a:latin typeface="+mj-lt"/>
+                <a:ea typeface="+mn-ea"/>
+                <a:cs typeface="+mn-cs"/>
+              </a:defRPr>
+            </a:lvl7pPr>
+            <a:lvl8pPr marL="3200400" indent="0" algn="ctr" defTabSz="914400" rtl="0" eaLnBrk="1" latinLnBrk="0" hangingPunct="1">
+              <a:spcBef>
+                <a:spcPct val="20000"/>
+              </a:spcBef>
+              <a:buFont typeface="Courier New" pitchFamily="49" charset="0"/>
+              <a:buNone/>
+              <a:defRPr sz="1600" kern="1200">
+                <a:solidFill>
+                  <a:schemeClr val="tx1">
+                    <a:tint val="75000"/>
+                  </a:schemeClr>
+                </a:solidFill>
+                <a:latin typeface="+mj-lt"/>
+                <a:ea typeface="+mn-ea"/>
+                <a:cs typeface="+mn-cs"/>
+              </a:defRPr>
+            </a:lvl8pPr>
+            <a:lvl9pPr marL="3657600" indent="0" algn="ctr" defTabSz="914400" rtl="0" eaLnBrk="1" latinLnBrk="0" hangingPunct="1">
+              <a:spcBef>
+                <a:spcPct val="20000"/>
+              </a:spcBef>
+              <a:buFont typeface="Arial" pitchFamily="34" charset="0"/>
+              <a:buNone/>
+              <a:defRPr sz="1600" kern="1200">
+                <a:solidFill>
+                  <a:schemeClr val="tx1">
+                    <a:tint val="75000"/>
+                  </a:schemeClr>
+                </a:solidFill>
+                <a:latin typeface="+mj-lt"/>
+                <a:ea typeface="+mn-ea"/>
+                <a:cs typeface="+mn-cs"/>
+              </a:defRPr>
+            </a:lvl9pPr>
+          </a:lstStyle>
           <a:p>
             <a:pPr marL="342900" indent="-342900" algn="l">
               <a:buFont typeface="Arial" panose="020B0604020202020204" pitchFamily="34" charset="0"/>
               <a:buChar char="•"/>
             </a:pPr>
-            <a:endParaRPr lang="en-US" sz="3200" dirty="0"/>
-          </a:p>
-        </p:txBody>
-      </p:sp>
-      <p:sp>
-        <p:nvSpPr>
-          <p:cNvPr id="4" name="Date Placeholder 3"/>
-          <p:cNvSpPr>
-            <a:spLocks noGrp="1"/>
-          </p:cNvSpPr>
-          <p:nvPr>
-            <p:ph type="dt" sz="half" idx="10"/>
-          </p:nvPr>
-        </p:nvSpPr>
-        <p:spPr/>
-        <p:txBody>
-          <a:bodyPr/>
-          <a:lstStyle/>
-          <a:p>
-            <a:fld id="{216C5678-EE20-4FA5-88E2-6E0BD67A2E26}" type="datetime1">
-              <a:rPr lang="en-US" smtClean="0"/>
-              <a:t>3/13/2016</a:t>
-            </a:fld>
-            <a:endParaRPr lang="en-US" dirty="0"/>
-          </a:p>
-        </p:txBody>
-      </p:sp>
-      <p:sp>
-        <p:nvSpPr>
-          <p:cNvPr id="5" name="Slide Number Placeholder 4"/>
-          <p:cNvSpPr>
-            <a:spLocks noGrp="1"/>
-          </p:cNvSpPr>
-          <p:nvPr>
-            <p:ph type="sldNum" sz="quarter" idx="11"/>
-          </p:nvPr>
-        </p:nvSpPr>
-        <p:spPr/>
-        <p:txBody>
-          <a:bodyPr/>
-          <a:lstStyle/>
-          <a:p>
-            <a:fld id="{BA9B540C-44DA-4F69-89C9-7C84606640D3}" type="slidenum">
-              <a:rPr lang="en-US" smtClean="0"/>
-              <a:pPr/>
-              <a:t>22</a:t>
-            </a:fld>
-            <a:endParaRPr lang="en-US" dirty="0"/>
-          </a:p>
-        </p:txBody>
-      </p:sp>
-      <p:sp>
-        <p:nvSpPr>
-          <p:cNvPr id="6" name="Footer Placeholder 5"/>
-          <p:cNvSpPr>
-            <a:spLocks noGrp="1"/>
-          </p:cNvSpPr>
-          <p:nvPr>
-            <p:ph type="ftr" sz="quarter" idx="12"/>
-          </p:nvPr>
-        </p:nvSpPr>
-        <p:spPr/>
-        <p:txBody>
-          <a:bodyPr/>
-          <a:lstStyle/>
-          <a:p>
-            <a:r>
-              <a:rPr lang="en-US" smtClean="0"/>
-              <a:t>Footer Text</a:t>
-            </a:r>
-            <a:endParaRPr lang="en-US" dirty="0"/>
+            <a:r>
+              <a:rPr lang="en-US" sz="2800" dirty="0" smtClean="0"/>
+              <a:t>Xx</a:t>
+            </a:r>
+          </a:p>
+          <a:p>
+            <a:pPr marL="342900" indent="-342900" algn="l">
+              <a:buFont typeface="Arial" panose="020B0604020202020204" pitchFamily="34" charset="0"/>
+              <a:buChar char="•"/>
+            </a:pPr>
+            <a:r>
+              <a:rPr lang="en-US" sz="2800" dirty="0" smtClean="0"/>
+              <a:t>Code Demo</a:t>
+            </a:r>
           </a:p>
         </p:txBody>
       </p:sp>
     </p:spTree>
     <p:extLst>
       <p:ext uri="{BB962C8B-B14F-4D97-AF65-F5344CB8AC3E}">
-        <p14:creationId xmlns:p14="http://schemas.microsoft.com/office/powerpoint/2010/main" val="2547404136"/>
+        <p14:creationId xmlns:p14="http://schemas.microsoft.com/office/powerpoint/2010/main" val="3192479005"/>
       </p:ext>
     </p:extLst>
   </p:cSld>
@@ -9359,6 +10208,364 @@
         <p:spPr>
           <a:xfrm>
             <a:off x="685800" y="228600"/>
+            <a:ext cx="7772400" cy="685800"/>
+          </a:xfrm>
+        </p:spPr>
+        <p:txBody>
+          <a:bodyPr/>
+          <a:lstStyle/>
+          <a:p>
+            <a:pPr algn="l"/>
+            <a:r>
+              <a:rPr lang="en-US" sz="4000" dirty="0" smtClean="0"/>
+              <a:t>Conclusion</a:t>
+            </a:r>
+            <a:endParaRPr lang="en-US" sz="4000" dirty="0"/>
+          </a:p>
+        </p:txBody>
+      </p:sp>
+      <p:sp>
+        <p:nvSpPr>
+          <p:cNvPr id="3" name="Subtitle 2"/>
+          <p:cNvSpPr>
+            <a:spLocks noGrp="1"/>
+          </p:cNvSpPr>
+          <p:nvPr>
+            <p:ph type="subTitle" idx="1"/>
+          </p:nvPr>
+        </p:nvSpPr>
+        <p:spPr>
+          <a:xfrm>
+            <a:off x="762000" y="1219200"/>
+            <a:ext cx="7315200" cy="4343400"/>
+          </a:xfrm>
+        </p:spPr>
+        <p:txBody>
+          <a:bodyPr>
+            <a:noAutofit/>
+          </a:bodyPr>
+          <a:lstStyle/>
+          <a:p>
+            <a:pPr marL="342900" indent="-342900" algn="l">
+              <a:buFont typeface="Arial" panose="020B0604020202020204" pitchFamily="34" charset="0"/>
+              <a:buChar char="•"/>
+            </a:pPr>
+            <a:r>
+              <a:rPr lang="en-US" sz="3200" dirty="0" smtClean="0"/>
+              <a:t>Discussed the 3 </a:t>
+            </a:r>
+            <a:r>
+              <a:rPr lang="en-US" sz="3200" dirty="0" err="1" smtClean="0"/>
+              <a:t>Ws</a:t>
+            </a:r>
+            <a:r>
+              <a:rPr lang="en-US" sz="3200" dirty="0" smtClean="0"/>
+              <a:t> and How.</a:t>
+            </a:r>
+          </a:p>
+          <a:p>
+            <a:pPr marL="342900" indent="-342900" algn="l">
+              <a:buFont typeface="Arial" panose="020B0604020202020204" pitchFamily="34" charset="0"/>
+              <a:buChar char="•"/>
+            </a:pPr>
+            <a:r>
+              <a:rPr lang="en-US" sz="3200" dirty="0" smtClean="0"/>
+              <a:t>Discussed the pros and cons of three review approaches.</a:t>
+            </a:r>
+          </a:p>
+          <a:p>
+            <a:pPr marL="342900" indent="-342900" algn="l">
+              <a:buFont typeface="Arial" panose="020B0604020202020204" pitchFamily="34" charset="0"/>
+              <a:buChar char="•"/>
+            </a:pPr>
+            <a:r>
+              <a:rPr lang="en-US" sz="3200" dirty="0" smtClean="0"/>
+              <a:t>Discussed various code review patterns and </a:t>
+            </a:r>
+            <a:r>
+              <a:rPr lang="en-US" sz="3200" dirty="0" err="1" smtClean="0"/>
+              <a:t>gotchas</a:t>
+            </a:r>
+            <a:r>
+              <a:rPr lang="en-US" sz="3200" smtClean="0"/>
+              <a:t>.</a:t>
+            </a:r>
+            <a:endParaRPr lang="en-US" sz="3200" dirty="0"/>
+          </a:p>
+        </p:txBody>
+      </p:sp>
+      <p:sp>
+        <p:nvSpPr>
+          <p:cNvPr id="4" name="Date Placeholder 3"/>
+          <p:cNvSpPr>
+            <a:spLocks noGrp="1"/>
+          </p:cNvSpPr>
+          <p:nvPr>
+            <p:ph type="dt" sz="half" idx="10"/>
+          </p:nvPr>
+        </p:nvSpPr>
+        <p:spPr/>
+        <p:txBody>
+          <a:bodyPr/>
+          <a:lstStyle/>
+          <a:p>
+            <a:fld id="{216C5678-EE20-4FA5-88E2-6E0BD67A2E26}" type="datetime1">
+              <a:rPr lang="en-US" smtClean="0"/>
+              <a:t>3/19/2016</a:t>
+            </a:fld>
+            <a:endParaRPr lang="en-US" dirty="0"/>
+          </a:p>
+        </p:txBody>
+      </p:sp>
+      <p:sp>
+        <p:nvSpPr>
+          <p:cNvPr id="5" name="Slide Number Placeholder 4"/>
+          <p:cNvSpPr>
+            <a:spLocks noGrp="1"/>
+          </p:cNvSpPr>
+          <p:nvPr>
+            <p:ph type="sldNum" sz="quarter" idx="11"/>
+          </p:nvPr>
+        </p:nvSpPr>
+        <p:spPr/>
+        <p:txBody>
+          <a:bodyPr/>
+          <a:lstStyle/>
+          <a:p>
+            <a:fld id="{BA9B540C-44DA-4F69-89C9-7C84606640D3}" type="slidenum">
+              <a:rPr lang="en-US" smtClean="0"/>
+              <a:pPr/>
+              <a:t>23</a:t>
+            </a:fld>
+            <a:endParaRPr lang="en-US" dirty="0"/>
+          </a:p>
+        </p:txBody>
+      </p:sp>
+      <p:sp>
+        <p:nvSpPr>
+          <p:cNvPr id="6" name="Footer Placeholder 5"/>
+          <p:cNvSpPr>
+            <a:spLocks noGrp="1"/>
+          </p:cNvSpPr>
+          <p:nvPr>
+            <p:ph type="ftr" sz="quarter" idx="12"/>
+          </p:nvPr>
+        </p:nvSpPr>
+        <p:spPr/>
+        <p:txBody>
+          <a:bodyPr/>
+          <a:lstStyle/>
+          <a:p>
+            <a:r>
+              <a:rPr lang="en-US" smtClean="0"/>
+              <a:t>Footer Text</a:t>
+            </a:r>
+            <a:endParaRPr lang="en-US" dirty="0"/>
+          </a:p>
+        </p:txBody>
+      </p:sp>
+    </p:spTree>
+    <p:extLst>
+      <p:ext uri="{BB962C8B-B14F-4D97-AF65-F5344CB8AC3E}">
+        <p14:creationId xmlns:p14="http://schemas.microsoft.com/office/powerpoint/2010/main" val="2740892730"/>
+      </p:ext>
+    </p:extLst>
+  </p:cSld>
+  <p:clrMapOvr>
+    <a:masterClrMapping/>
+  </p:clrMapOvr>
+</p:sld>
+</file>
+
+<file path=ppt/slides/slide24.xml><?xml version="1.0" encoding="utf-8"?>
+<p:sld xmlns:a="http://schemas.openxmlformats.org/drawingml/2006/main" xmlns:r="http://schemas.openxmlformats.org/officeDocument/2006/relationships" xmlns:p="http://schemas.openxmlformats.org/presentationml/2006/main">
+  <p:cSld>
+    <p:spTree>
+      <p:nvGrpSpPr>
+        <p:cNvPr id="1" name=""/>
+        <p:cNvGrpSpPr/>
+        <p:nvPr/>
+      </p:nvGrpSpPr>
+      <p:grpSpPr>
+        <a:xfrm>
+          <a:off x="0" y="0"/>
+          <a:ext cx="0" cy="0"/>
+          <a:chOff x="0" y="0"/>
+          <a:chExt cx="0" cy="0"/>
+        </a:xfrm>
+      </p:grpSpPr>
+      <p:sp>
+        <p:nvSpPr>
+          <p:cNvPr id="2" name="Title 1"/>
+          <p:cNvSpPr>
+            <a:spLocks noGrp="1"/>
+          </p:cNvSpPr>
+          <p:nvPr>
+            <p:ph type="ctrTitle"/>
+          </p:nvPr>
+        </p:nvSpPr>
+        <p:spPr>
+          <a:xfrm>
+            <a:off x="685800" y="228600"/>
+            <a:ext cx="7772400" cy="685800"/>
+          </a:xfrm>
+        </p:spPr>
+        <p:txBody>
+          <a:bodyPr/>
+          <a:lstStyle/>
+          <a:p>
+            <a:pPr algn="l"/>
+            <a:r>
+              <a:rPr lang="en-US" sz="4000" dirty="0" smtClean="0"/>
+              <a:t>xx</a:t>
+            </a:r>
+            <a:endParaRPr lang="en-US" sz="4000" dirty="0"/>
+          </a:p>
+        </p:txBody>
+      </p:sp>
+      <p:sp>
+        <p:nvSpPr>
+          <p:cNvPr id="3" name="Subtitle 2"/>
+          <p:cNvSpPr>
+            <a:spLocks noGrp="1"/>
+          </p:cNvSpPr>
+          <p:nvPr>
+            <p:ph type="subTitle" idx="1"/>
+          </p:nvPr>
+        </p:nvSpPr>
+        <p:spPr>
+          <a:xfrm>
+            <a:off x="762000" y="1219200"/>
+            <a:ext cx="7315200" cy="4343400"/>
+          </a:xfrm>
+        </p:spPr>
+        <p:txBody>
+          <a:bodyPr>
+            <a:noAutofit/>
+          </a:bodyPr>
+          <a:lstStyle/>
+          <a:p>
+            <a:pPr marL="342900" indent="-342900" algn="l">
+              <a:buFont typeface="Arial" panose="020B0604020202020204" pitchFamily="34" charset="0"/>
+              <a:buChar char="•"/>
+            </a:pPr>
+            <a:endParaRPr lang="en-US" sz="3200" dirty="0"/>
+          </a:p>
+        </p:txBody>
+      </p:sp>
+      <p:sp>
+        <p:nvSpPr>
+          <p:cNvPr id="4" name="Date Placeholder 3"/>
+          <p:cNvSpPr>
+            <a:spLocks noGrp="1"/>
+          </p:cNvSpPr>
+          <p:nvPr>
+            <p:ph type="dt" sz="half" idx="10"/>
+          </p:nvPr>
+        </p:nvSpPr>
+        <p:spPr/>
+        <p:txBody>
+          <a:bodyPr/>
+          <a:lstStyle/>
+          <a:p>
+            <a:fld id="{216C5678-EE20-4FA5-88E2-6E0BD67A2E26}" type="datetime1">
+              <a:rPr lang="en-US" smtClean="0"/>
+              <a:t>3/19/2016</a:t>
+            </a:fld>
+            <a:endParaRPr lang="en-US" dirty="0"/>
+          </a:p>
+        </p:txBody>
+      </p:sp>
+      <p:sp>
+        <p:nvSpPr>
+          <p:cNvPr id="5" name="Slide Number Placeholder 4"/>
+          <p:cNvSpPr>
+            <a:spLocks noGrp="1"/>
+          </p:cNvSpPr>
+          <p:nvPr>
+            <p:ph type="sldNum" sz="quarter" idx="11"/>
+          </p:nvPr>
+        </p:nvSpPr>
+        <p:spPr/>
+        <p:txBody>
+          <a:bodyPr/>
+          <a:lstStyle/>
+          <a:p>
+            <a:fld id="{BA9B540C-44DA-4F69-89C9-7C84606640D3}" type="slidenum">
+              <a:rPr lang="en-US" smtClean="0"/>
+              <a:pPr/>
+              <a:t>24</a:t>
+            </a:fld>
+            <a:endParaRPr lang="en-US" dirty="0"/>
+          </a:p>
+        </p:txBody>
+      </p:sp>
+      <p:sp>
+        <p:nvSpPr>
+          <p:cNvPr id="6" name="Footer Placeholder 5"/>
+          <p:cNvSpPr>
+            <a:spLocks noGrp="1"/>
+          </p:cNvSpPr>
+          <p:nvPr>
+            <p:ph type="ftr" sz="quarter" idx="12"/>
+          </p:nvPr>
+        </p:nvSpPr>
+        <p:spPr/>
+        <p:txBody>
+          <a:bodyPr/>
+          <a:lstStyle/>
+          <a:p>
+            <a:r>
+              <a:rPr lang="en-US" smtClean="0"/>
+              <a:t>Footer Text</a:t>
+            </a:r>
+            <a:endParaRPr lang="en-US" dirty="0"/>
+          </a:p>
+        </p:txBody>
+      </p:sp>
+    </p:spTree>
+    <p:extLst>
+      <p:ext uri="{BB962C8B-B14F-4D97-AF65-F5344CB8AC3E}">
+        <p14:creationId xmlns:p14="http://schemas.microsoft.com/office/powerpoint/2010/main" val="2547404136"/>
+      </p:ext>
+    </p:extLst>
+  </p:cSld>
+  <p:clrMapOvr>
+    <a:masterClrMapping/>
+  </p:clrMapOvr>
+</p:sld>
+</file>
+
+<file path=ppt/slides/slide25.xml><?xml version="1.0" encoding="utf-8"?>
+<p:sld xmlns:a="http://schemas.openxmlformats.org/drawingml/2006/main" xmlns:r="http://schemas.openxmlformats.org/officeDocument/2006/relationships" xmlns:p="http://schemas.openxmlformats.org/presentationml/2006/main">
+  <p:cSld>
+    <p:spTree>
+      <p:nvGrpSpPr>
+        <p:cNvPr id="1" name=""/>
+        <p:cNvGrpSpPr/>
+        <p:nvPr/>
+      </p:nvGrpSpPr>
+      <p:grpSpPr>
+        <a:xfrm>
+          <a:off x="0" y="0"/>
+          <a:ext cx="0" cy="0"/>
+          <a:chOff x="0" y="0"/>
+          <a:chExt cx="0" cy="0"/>
+        </a:xfrm>
+      </p:grpSpPr>
+      <p:sp>
+        <p:nvSpPr>
+          <p:cNvPr id="2" name="Title 1"/>
+          <p:cNvSpPr>
+            <a:spLocks noGrp="1"/>
+          </p:cNvSpPr>
+          <p:nvPr>
+            <p:ph type="ctrTitle"/>
+          </p:nvPr>
+        </p:nvSpPr>
+        <p:spPr>
+          <a:xfrm>
+            <a:off x="685800" y="228600"/>
             <a:ext cx="8458200" cy="685800"/>
           </a:xfrm>
         </p:spPr>
@@ -9392,7 +10599,7 @@
           <a:p>
             <a:fld id="{216C5678-EE20-4FA5-88E2-6E0BD67A2E26}" type="datetime1">
               <a:rPr lang="en-US" smtClean="0"/>
-              <a:t>3/13/2016</a:t>
+              <a:t>3/19/2016</a:t>
             </a:fld>
             <a:endParaRPr lang="en-US" dirty="0"/>
           </a:p>
@@ -9416,7 +10623,7 @@
             <a:fld id="{BA9B540C-44DA-4F69-89C9-7C84606640D3}" type="slidenum">
               <a:rPr lang="en-US" smtClean="0"/>
               <a:pPr/>
-              <a:t>23</a:t>
+              <a:t>25</a:t>
             </a:fld>
             <a:endParaRPr lang="en-US" dirty="0"/>
           </a:p>
@@ -9850,7 +11057,7 @@
           <a:p>
             <a:fld id="{216C5678-EE20-4FA5-88E2-6E0BD67A2E26}" type="datetime1">
               <a:rPr lang="en-US" smtClean="0"/>
-              <a:t>3/13/2016</a:t>
+              <a:t>3/19/2016</a:t>
             </a:fld>
             <a:endParaRPr lang="en-US" dirty="0"/>
           </a:p>
@@ -9974,8 +11181,8 @@
         </p:nvSpPr>
         <p:spPr>
           <a:xfrm>
-            <a:off x="228600" y="914400"/>
-            <a:ext cx="8610600" cy="5486400"/>
+            <a:off x="228599" y="914400"/>
+            <a:ext cx="8876653" cy="5486400"/>
           </a:xfrm>
         </p:spPr>
         <p:txBody>
@@ -9989,7 +11196,7 @@
               <a:buChar char="•"/>
             </a:pPr>
             <a:r>
-              <a:rPr lang="en-US" sz="3200" dirty="0" smtClean="0"/>
+              <a:rPr lang="en-US" sz="2800" dirty="0" smtClean="0"/>
               <a:t>Very effective way to discover defects &amp; difficult-to-find bugs.</a:t>
             </a:r>
           </a:p>
@@ -10010,13 +11217,8 @@
           <a:p>
             <a:r>
               <a:rPr lang="en-US" sz="2000" dirty="0" smtClean="0"/>
-              <a:t>high </a:t>
-            </a:r>
-            <a:r>
-              <a:rPr lang="en-US" sz="2000" smtClean="0"/>
-              <a:t>quality product</a:t>
-            </a:r>
-            <a:endParaRPr lang="en-US" sz="2000" dirty="0" smtClean="0"/>
+              <a:t>High-quality product</a:t>
+            </a:r>
           </a:p>
           <a:p>
             <a:pPr marL="342900" indent="-342900" algn="l">
@@ -10024,7 +11226,7 @@
               <a:buChar char="•"/>
             </a:pPr>
             <a:r>
-              <a:rPr lang="en-US" sz="3200" dirty="0" smtClean="0"/>
+              <a:rPr lang="en-US" sz="2800" dirty="0" smtClean="0"/>
               <a:t>Provides a check before code goes to production.</a:t>
             </a:r>
           </a:p>
@@ -10034,8 +11236,8 @@
               <a:buChar char="•"/>
             </a:pPr>
             <a:r>
-              <a:rPr lang="en-US" sz="3200" dirty="0" smtClean="0"/>
-              <a:t>To learn from each other and be better developers.</a:t>
+              <a:rPr lang="en-US" sz="2800" dirty="0" smtClean="0"/>
+              <a:t>Encourage developers to write cleaner and better code since it will be looked at.</a:t>
             </a:r>
           </a:p>
           <a:p>
@@ -10044,8 +11246,8 @@
               <a:buChar char="•"/>
             </a:pPr>
             <a:r>
-              <a:rPr lang="en-US" sz="3200" dirty="0" smtClean="0"/>
-              <a:t>Improve quality of the team &amp; code.</a:t>
+              <a:rPr lang="en-US" sz="2800" dirty="0" smtClean="0"/>
+              <a:t>To learn from each other &amp; share “tribal knowledge”.</a:t>
             </a:r>
           </a:p>
           <a:p>
@@ -10054,11 +11256,21 @@
               <a:buChar char="•"/>
             </a:pPr>
             <a:r>
-              <a:rPr lang="en-US" sz="3200" dirty="0" smtClean="0"/>
+              <a:rPr lang="en-US" sz="2800" dirty="0" smtClean="0"/>
+              <a:t>Improve quality of the team &amp; code.</a:t>
+            </a:r>
+          </a:p>
+          <a:p>
+            <a:pPr marL="342900" indent="-342900" algn="l">
+              <a:buFont typeface="Arial" panose="020B0604020202020204" pitchFamily="34" charset="0"/>
+              <a:buChar char="•"/>
+            </a:pPr>
+            <a:r>
+              <a:rPr lang="en-US" sz="2800" dirty="0" smtClean="0"/>
               <a:t>Meet </a:t>
             </a:r>
             <a:r>
-              <a:rPr lang="en-US" sz="3200" dirty="0"/>
+              <a:rPr lang="en-US" sz="2800" dirty="0"/>
               <a:t>CMMI Level 3</a:t>
             </a:r>
           </a:p>
@@ -10088,7 +11300,7 @@
           <a:p>
             <a:fld id="{216C5678-EE20-4FA5-88E2-6E0BD67A2E26}" type="datetime1">
               <a:rPr lang="en-US" smtClean="0"/>
-              <a:t>3/13/2016</a:t>
+              <a:t>3/19/2016</a:t>
             </a:fld>
             <a:endParaRPr lang="en-US" dirty="0"/>
           </a:p>
@@ -10293,7 +11505,7 @@
           <a:p>
             <a:fld id="{216C5678-EE20-4FA5-88E2-6E0BD67A2E26}" type="datetime1">
               <a:rPr lang="en-US" smtClean="0"/>
-              <a:t>3/13/2016</a:t>
+              <a:t>3/19/2016</a:t>
             </a:fld>
             <a:endParaRPr lang="en-US" dirty="0"/>
           </a:p>
@@ -10476,7 +11688,7 @@
           <a:p>
             <a:fld id="{216C5678-EE20-4FA5-88E2-6E0BD67A2E26}" type="datetime1">
               <a:rPr lang="en-US" smtClean="0"/>
-              <a:t>3/13/2016</a:t>
+              <a:t>3/19/2016</a:t>
             </a:fld>
             <a:endParaRPr lang="en-US" dirty="0"/>
           </a:p>
@@ -10646,7 +11858,7 @@
           <a:p>
             <a:fld id="{216C5678-EE20-4FA5-88E2-6E0BD67A2E26}" type="datetime1">
               <a:rPr lang="en-US" smtClean="0"/>
-              <a:t>3/13/2016</a:t>
+              <a:t>3/19/2016</a:t>
             </a:fld>
             <a:endParaRPr lang="en-US" dirty="0"/>
           </a:p>
@@ -11235,7 +12447,7 @@
         </p:nvSpPr>
         <p:spPr>
           <a:xfrm>
-            <a:off x="152400" y="869950"/>
+            <a:off x="152400" y="838200"/>
             <a:ext cx="8839200" cy="5486400"/>
           </a:xfrm>
         </p:spPr>
@@ -11301,7 +12513,7 @@
             </a:pPr>
             <a:r>
               <a:rPr lang="en-US" sz="3200" dirty="0" smtClean="0"/>
-              <a:t>200 SLOC/</a:t>
+              <a:t>200-400 SLOC/</a:t>
             </a:r>
             <a:r>
               <a:rPr lang="en-US" sz="3200" dirty="0" err="1" smtClean="0"/>
@@ -11338,7 +12550,15 @@
             </a:r>
             <a:r>
               <a:rPr lang="en-US" sz="3200" dirty="0" smtClean="0"/>
-              <a:t>Style Guide available</a:t>
+              <a:t>Style Guide or </a:t>
+            </a:r>
+            <a:r>
+              <a:rPr lang="en-US" sz="3200" dirty="0"/>
+              <a:t>C</a:t>
+            </a:r>
+            <a:r>
+              <a:rPr lang="en-US" sz="3200" dirty="0" smtClean="0"/>
+              <a:t>hecklist available</a:t>
             </a:r>
             <a:r>
               <a:rPr lang="en-US" sz="3200" dirty="0"/>
@@ -11375,7 +12595,7 @@
           <a:p>
             <a:fld id="{216C5678-EE20-4FA5-88E2-6E0BD67A2E26}" type="datetime1">
               <a:rPr lang="en-US" smtClean="0"/>
-              <a:t>3/13/2016</a:t>
+              <a:t>3/19/2016</a:t>
             </a:fld>
             <a:endParaRPr lang="en-US" dirty="0"/>
           </a:p>
@@ -11430,7 +12650,7 @@
       </p:sp>
       <p:pic>
         <p:nvPicPr>
-          <p:cNvPr id="7" name="Picture 6"/>
+          <p:cNvPr id="8" name="Picture 7"/>
           <p:cNvPicPr>
             <a:picLocks noChangeAspect="1"/>
           </p:cNvPicPr>
@@ -11444,8 +12664,8 @@
         </p:blipFill>
         <p:spPr>
           <a:xfrm>
-            <a:off x="3753174" y="3505200"/>
-            <a:ext cx="3333426" cy="2490265"/>
+            <a:off x="4191000" y="3505200"/>
+            <a:ext cx="3810796" cy="2362200"/>
           </a:xfrm>
           <a:prstGeom prst="rect">
             <a:avLst/>
@@ -11531,7 +12751,7 @@
         <p:spPr>
           <a:xfrm>
             <a:off x="228600" y="1219200"/>
-            <a:ext cx="8610600" cy="2438400"/>
+            <a:ext cx="8686800" cy="4724400"/>
           </a:xfrm>
         </p:spPr>
         <p:txBody>
@@ -11546,11 +12766,11 @@
             </a:pPr>
             <a:r>
               <a:rPr lang="en-US" sz="3200" dirty="0"/>
-              <a:t>Goal:  100% review (best</a:t>
+              <a:t>Goal:  100% </a:t>
             </a:r>
             <a:r>
               <a:rPr lang="en-US" sz="3200" dirty="0" smtClean="0"/>
-              <a:t>)</a:t>
+              <a:t>coverage</a:t>
             </a:r>
           </a:p>
           <a:p>
@@ -11561,7 +12781,7 @@
             </a:r>
             <a:r>
               <a:rPr lang="en-US" sz="3200" dirty="0" smtClean="0"/>
-              <a:t>                75%+ is still good.</a:t>
+              <a:t>                75%+ coverage is still good.</a:t>
             </a:r>
             <a:endParaRPr lang="en-US" sz="3200" dirty="0"/>
           </a:p>
@@ -11594,19 +12814,28 @@
             </a:pPr>
             <a:r>
               <a:rPr lang="en-US" sz="3200" dirty="0" smtClean="0"/>
-              <a:t>“No Fear” &amp; “No Retaliation Mentality” environment.</a:t>
-            </a:r>
-          </a:p>
-          <a:p>
-            <a:pPr marL="514350" indent="-514350" algn="l">
+              <a:t>Foster a positive culture.</a:t>
+            </a:r>
+          </a:p>
+          <a:p>
+            <a:pPr marL="800100" lvl="1" indent="-342900" algn="l">
               <a:buFont typeface="Arial" panose="020B0604020202020204" pitchFamily="34" charset="0"/>
               <a:buChar char="•"/>
             </a:pPr>
             <a:r>
-              <a:rPr lang="en-US" sz="3200" dirty="0" smtClean="0"/>
-              <a:t>“No penalty” for rejecting code which may delay a release.</a:t>
-            </a:r>
-            <a:endParaRPr lang="en-US" sz="3200" dirty="0"/>
+              <a:rPr lang="en-US" sz="2400" dirty="0" smtClean="0"/>
+              <a:t>“No Fear” &amp; “No Retaliation” environment.</a:t>
+            </a:r>
+          </a:p>
+          <a:p>
+            <a:pPr marL="800100" lvl="1" indent="-342900" algn="l">
+              <a:buFont typeface="Arial" panose="020B0604020202020204" pitchFamily="34" charset="0"/>
+              <a:buChar char="•"/>
+            </a:pPr>
+            <a:r>
+              <a:rPr lang="en-US" sz="2400" dirty="0" smtClean="0"/>
+              <a:t>“No penalty” for rejecting code &amp; may delay a release.</a:t>
+            </a:r>
           </a:p>
         </p:txBody>
       </p:sp>
@@ -11627,7 +12856,7 @@
           <a:p>
             <a:fld id="{216C5678-EE20-4FA5-88E2-6E0BD67A2E26}" type="datetime1">
               <a:rPr lang="en-US" smtClean="0"/>
-              <a:t>3/13/2016</a:t>
+              <a:t>3/19/2016</a:t>
             </a:fld>
             <a:endParaRPr lang="en-US" dirty="0"/>
           </a:p>

</xml_diff>